<commit_message>
multitenancy slides and text (#3)
* mt

* provider config
</commit_message>
<xml_diff>
--- a/docs/slides/PART 1/intro_iac_landscape.pptx
+++ b/docs/slides/PART 1/intro_iac_landscape.pptx
@@ -3,16 +3,15 @@
 <p:presentation xmlns:a="http://schemas.openxmlformats.org/drawingml/2006/main" xmlns:p="http://schemas.openxmlformats.org/presentationml/2006/main" xmlns:r="http://schemas.openxmlformats.org/officeDocument/2006/relationships" xmlns:p14="http://schemas.microsoft.com/office/powerpoint/2010/main" xmlns:p15="http://schemas.microsoft.com/office/powerpoint/2012/main" xmlns:mc="http://schemas.openxmlformats.org/markup-compatibility/2006">
   <p:sldMasterIdLst>
     <p:sldMasterId id="2147483648" r:id="rId2"/>
-    <p:sldMasterId id="2147483661" r:id="rId3"/>
   </p:sldMasterIdLst>
   <p:notesMasterIdLst>
-    <p:notesMasterId r:id="rId4"/>
+    <p:notesMasterId r:id="rId3"/>
   </p:notesMasterIdLst>
   <p:sldIdLst>
-    <p:sldId id="256" r:id="rId5"/>
-    <p:sldId id="257" r:id="rId6"/>
-    <p:sldId id="258" r:id="rId7"/>
-    <p:sldId id="259" r:id="rId8"/>
+    <p:sldId id="256" r:id="rId4"/>
+    <p:sldId id="257" r:id="rId5"/>
+    <p:sldId id="258" r:id="rId6"/>
+    <p:sldId id="259" r:id="rId7"/>
   </p:sldIdLst>
   <p:sldSz cx="9144000" cy="6858000"/>
   <p:notesSz cx="6858000" cy="9144000"/>
@@ -38,7 +37,7 @@
       </p:grpSpPr>
       <p:sp>
         <p:nvSpPr>
-          <p:cNvPr id="84" name="PlaceHolder 1"/>
+          <p:cNvPr id="43" name="PlaceHolder 1"/>
           <p:cNvSpPr>
             <a:spLocks noGrp="1"/>
           </p:cNvSpPr>
@@ -85,7 +84,7 @@
       </p:sp>
       <p:sp>
         <p:nvSpPr>
-          <p:cNvPr id="85" name="PlaceHolder 2"/>
+          <p:cNvPr id="44" name="PlaceHolder 2"/>
           <p:cNvSpPr>
             <a:spLocks noGrp="1"/>
           </p:cNvSpPr>
@@ -134,7 +133,7 @@
       </p:sp>
       <p:sp>
         <p:nvSpPr>
-          <p:cNvPr id="86" name="PlaceHolder 3"/>
+          <p:cNvPr id="45" name="PlaceHolder 3"/>
           <p:cNvSpPr>
             <a:spLocks noGrp="1"/>
           </p:cNvSpPr>
@@ -183,12 +182,12 @@
       </p:sp>
       <p:sp>
         <p:nvSpPr>
-          <p:cNvPr id="87" name="PlaceHolder 4"/>
-          <p:cNvSpPr>
-            <a:spLocks noGrp="1"/>
-          </p:cNvSpPr>
-          <p:nvPr>
-            <p:ph type="dt" idx="7"/>
+          <p:cNvPr id="46" name="PlaceHolder 4"/>
+          <p:cNvSpPr>
+            <a:spLocks noGrp="1"/>
+          </p:cNvSpPr>
+          <p:nvPr>
+            <p:ph type="dt" idx="4"/>
           </p:nvPr>
         </p:nvSpPr>
         <p:spPr>
@@ -243,12 +242,12 @@
       </p:sp>
       <p:sp>
         <p:nvSpPr>
-          <p:cNvPr id="88" name="PlaceHolder 5"/>
-          <p:cNvSpPr>
-            <a:spLocks noGrp="1"/>
-          </p:cNvSpPr>
-          <p:nvPr>
-            <p:ph type="ftr" idx="8"/>
+          <p:cNvPr id="47" name="PlaceHolder 5"/>
+          <p:cNvSpPr>
+            <a:spLocks noGrp="1"/>
+          </p:cNvSpPr>
+          <p:nvPr>
+            <p:ph type="ftr" idx="5"/>
           </p:nvPr>
         </p:nvSpPr>
         <p:spPr>
@@ -303,12 +302,12 @@
       </p:sp>
       <p:sp>
         <p:nvSpPr>
-          <p:cNvPr id="89" name="PlaceHolder 6"/>
-          <p:cNvSpPr>
-            <a:spLocks noGrp="1"/>
-          </p:cNvSpPr>
-          <p:nvPr>
-            <p:ph type="sldNum" idx="9"/>
+          <p:cNvPr id="48" name="PlaceHolder 6"/>
+          <p:cNvSpPr>
+            <a:spLocks noGrp="1"/>
+          </p:cNvSpPr>
+          <p:nvPr>
+            <p:ph type="sldNum" idx="6"/>
           </p:nvPr>
         </p:nvSpPr>
         <p:spPr>
@@ -343,7 +342,7 @@
             <a:pPr indent="0" algn="r">
               <a:buNone/>
             </a:pPr>
-            <a:fld id="{762ABF40-73BD-4C54-AB2A-33C17D4A15C6}" type="slidenum">
+            <a:fld id="{147083A9-756F-4001-BDE3-F3897839D4A2}" type="slidenum">
               <a:rPr b="0" lang="en-US" sz="1400" spc="-1" strike="noStrike">
                 <a:solidFill>
                   <a:srgbClr val="000000"/>
@@ -386,7 +385,7 @@
       </p:grpSpPr>
       <p:sp>
         <p:nvSpPr>
-          <p:cNvPr id="98" name="PlaceHolder 1"/>
+          <p:cNvPr id="57" name="PlaceHolder 1"/>
           <p:cNvSpPr>
             <a:spLocks noGrp="1"/>
           </p:cNvSpPr>
@@ -397,19 +396,19 @@
         <p:spPr>
           <a:xfrm>
             <a:off x="1143000" y="685800"/>
-            <a:ext cx="4571280" cy="3428280"/>
-          </a:xfrm>
-          <a:prstGeom prst="rect">
-            <a:avLst/>
-          </a:prstGeom>
-          <a:ln w="0">
-            <a:noFill/>
-          </a:ln>
-        </p:spPr>
-      </p:sp>
-      <p:sp>
-        <p:nvSpPr>
-          <p:cNvPr id="99" name="PlaceHolder 2"/>
+            <a:ext cx="4570560" cy="3427560"/>
+          </a:xfrm>
+          <a:prstGeom prst="rect">
+            <a:avLst/>
+          </a:prstGeom>
+          <a:ln w="0">
+            <a:noFill/>
+          </a:ln>
+        </p:spPr>
+      </p:sp>
+      <p:sp>
+        <p:nvSpPr>
+          <p:cNvPr id="58" name="PlaceHolder 2"/>
           <p:cNvSpPr>
             <a:spLocks noGrp="1"/>
           </p:cNvSpPr>
@@ -420,7 +419,7 @@
         <p:spPr>
           <a:xfrm>
             <a:off x="685800" y="4343400"/>
-            <a:ext cx="5485680" cy="4114080"/>
+            <a:ext cx="5484960" cy="4113360"/>
           </a:xfrm>
           <a:prstGeom prst="rect">
             <a:avLst/>
@@ -586,18 +585,18 @@
       </p:sp>
       <p:sp>
         <p:nvSpPr>
-          <p:cNvPr id="100" name="PlaceHolder 3"/>
-          <p:cNvSpPr>
-            <a:spLocks noGrp="1"/>
-          </p:cNvSpPr>
-          <p:nvPr>
-            <p:ph type="sldNum" idx="10"/>
+          <p:cNvPr id="59" name="PlaceHolder 3"/>
+          <p:cNvSpPr>
+            <a:spLocks noGrp="1"/>
+          </p:cNvSpPr>
+          <p:nvPr>
+            <p:ph type="sldNum" idx="7"/>
           </p:nvPr>
         </p:nvSpPr>
         <p:spPr>
           <a:xfrm>
             <a:off x="3884760" y="8685360"/>
-            <a:ext cx="2971080" cy="456480"/>
+            <a:ext cx="2970360" cy="455760"/>
           </a:xfrm>
           <a:prstGeom prst="rect">
             <a:avLst/>
@@ -638,7 +637,7 @@
                 <a:tab algn="l" pos="0"/>
               </a:tabLst>
             </a:pPr>
-            <a:fld id="{3B696144-3720-4B42-8ECA-4BD68C6C2415}" type="slidenum">
+            <a:fld id="{D598977A-97D5-4920-A74A-BCDCDA572CEF}" type="slidenum">
               <a:rPr b="0" lang="en-US" sz="1200" spc="-1" strike="noStrike">
                 <a:solidFill>
                   <a:srgbClr val="000000"/>
@@ -680,7 +679,7 @@
       </p:grpSpPr>
       <p:sp>
         <p:nvSpPr>
-          <p:cNvPr id="101" name="PlaceHolder 1"/>
+          <p:cNvPr id="60" name="PlaceHolder 1"/>
           <p:cNvSpPr>
             <a:spLocks noGrp="1"/>
           </p:cNvSpPr>
@@ -691,19 +690,19 @@
         <p:spPr>
           <a:xfrm>
             <a:off x="1143000" y="685800"/>
-            <a:ext cx="4570920" cy="3427920"/>
-          </a:xfrm>
-          <a:prstGeom prst="rect">
-            <a:avLst/>
-          </a:prstGeom>
-          <a:ln w="0">
-            <a:noFill/>
-          </a:ln>
-        </p:spPr>
-      </p:sp>
-      <p:sp>
-        <p:nvSpPr>
-          <p:cNvPr id="102" name="PlaceHolder 2"/>
+            <a:ext cx="4570200" cy="3427200"/>
+          </a:xfrm>
+          <a:prstGeom prst="rect">
+            <a:avLst/>
+          </a:prstGeom>
+          <a:ln w="0">
+            <a:noFill/>
+          </a:ln>
+        </p:spPr>
+      </p:sp>
+      <p:sp>
+        <p:nvSpPr>
+          <p:cNvPr id="61" name="PlaceHolder 2"/>
           <p:cNvSpPr>
             <a:spLocks noGrp="1"/>
           </p:cNvSpPr>
@@ -714,7 +713,7 @@
         <p:spPr>
           <a:xfrm>
             <a:off x="685800" y="4343400"/>
-            <a:ext cx="5485320" cy="4113720"/>
+            <a:ext cx="5484600" cy="4113000"/>
           </a:xfrm>
           <a:prstGeom prst="rect">
             <a:avLst/>
@@ -845,18 +844,18 @@
       </p:sp>
       <p:sp>
         <p:nvSpPr>
-          <p:cNvPr id="103" name="PlaceHolder 3"/>
-          <p:cNvSpPr>
-            <a:spLocks noGrp="1"/>
-          </p:cNvSpPr>
-          <p:nvPr>
-            <p:ph type="sldNum" idx="11"/>
+          <p:cNvPr id="62" name="PlaceHolder 3"/>
+          <p:cNvSpPr>
+            <a:spLocks noGrp="1"/>
+          </p:cNvSpPr>
+          <p:nvPr>
+            <p:ph type="sldNum" idx="8"/>
           </p:nvPr>
         </p:nvSpPr>
         <p:spPr>
           <a:xfrm>
             <a:off x="3884760" y="8685360"/>
-            <a:ext cx="2970720" cy="456120"/>
+            <a:ext cx="2970000" cy="455400"/>
           </a:xfrm>
           <a:prstGeom prst="rect">
             <a:avLst/>
@@ -897,7 +896,7 @@
                 <a:tab algn="l" pos="0"/>
               </a:tabLst>
             </a:pPr>
-            <a:fld id="{9CF200FF-2E0B-4DFA-B03F-CBFA0DB886ED}" type="slidenum">
+            <a:fld id="{C5DAF9AD-5CE2-4E56-986D-F6FD4A071C55}" type="slidenum">
               <a:rPr b="0" lang="en-US" sz="1200" spc="-1" strike="noStrike">
                 <a:solidFill>
                   <a:srgbClr val="000000"/>
@@ -939,7 +938,7 @@
       </p:grpSpPr>
       <p:sp>
         <p:nvSpPr>
-          <p:cNvPr id="104" name="PlaceHolder 1"/>
+          <p:cNvPr id="63" name="PlaceHolder 1"/>
           <p:cNvSpPr>
             <a:spLocks noGrp="1"/>
           </p:cNvSpPr>
@@ -950,19 +949,19 @@
         <p:spPr>
           <a:xfrm>
             <a:off x="1143000" y="685800"/>
-            <a:ext cx="4570920" cy="3427920"/>
-          </a:xfrm>
-          <a:prstGeom prst="rect">
-            <a:avLst/>
-          </a:prstGeom>
-          <a:ln w="0">
-            <a:noFill/>
-          </a:ln>
-        </p:spPr>
-      </p:sp>
-      <p:sp>
-        <p:nvSpPr>
-          <p:cNvPr id="105" name="PlaceHolder 2"/>
+            <a:ext cx="4570200" cy="3427200"/>
+          </a:xfrm>
+          <a:prstGeom prst="rect">
+            <a:avLst/>
+          </a:prstGeom>
+          <a:ln w="0">
+            <a:noFill/>
+          </a:ln>
+        </p:spPr>
+      </p:sp>
+      <p:sp>
+        <p:nvSpPr>
+          <p:cNvPr id="64" name="PlaceHolder 2"/>
           <p:cNvSpPr>
             <a:spLocks noGrp="1"/>
           </p:cNvSpPr>
@@ -973,7 +972,7 @@
         <p:spPr>
           <a:xfrm>
             <a:off x="685800" y="4343400"/>
-            <a:ext cx="5485320" cy="4113720"/>
+            <a:ext cx="5484600" cy="4113000"/>
           </a:xfrm>
           <a:prstGeom prst="rect">
             <a:avLst/>
@@ -1104,18 +1103,18 @@
       </p:sp>
       <p:sp>
         <p:nvSpPr>
-          <p:cNvPr id="106" name="PlaceHolder 3"/>
-          <p:cNvSpPr>
-            <a:spLocks noGrp="1"/>
-          </p:cNvSpPr>
-          <p:nvPr>
-            <p:ph type="sldNum" idx="12"/>
+          <p:cNvPr id="65" name="PlaceHolder 3"/>
+          <p:cNvSpPr>
+            <a:spLocks noGrp="1"/>
+          </p:cNvSpPr>
+          <p:nvPr>
+            <p:ph type="sldNum" idx="9"/>
           </p:nvPr>
         </p:nvSpPr>
         <p:spPr>
           <a:xfrm>
             <a:off x="3884760" y="8685360"/>
-            <a:ext cx="2970720" cy="456120"/>
+            <a:ext cx="2970000" cy="455400"/>
           </a:xfrm>
           <a:prstGeom prst="rect">
             <a:avLst/>
@@ -1156,7 +1155,7 @@
                 <a:tab algn="l" pos="0"/>
               </a:tabLst>
             </a:pPr>
-            <a:fld id="{8D23BEDC-1C51-4D8B-9B14-4284B3F70B00}" type="slidenum">
+            <a:fld id="{8A53D1A2-1AC7-4E1B-B7A7-49CF81E0860D}" type="slidenum">
               <a:rPr b="0" lang="en-US" sz="1200" spc="-1" strike="noStrike">
                 <a:solidFill>
                   <a:srgbClr val="000000"/>
@@ -1230,7 +1229,7 @@
         <p:txBody>
           <a:bodyPr/>
           <a:p>
-            <a:fld id="{6CB6CF33-5DEF-43A9-8672-2AFA8540D69F}" type="slidenum">
+            <a:fld id="{E4040CEA-E7CC-495B-A6FC-B95B9387AEAE}" type="slidenum">
               <a:t>&lt;#&gt;</a:t>
             </a:fld>
           </a:p>
@@ -1292,7 +1291,7 @@
         <p:spPr>
           <a:xfrm>
             <a:off x="457200" y="274680"/>
-            <a:ext cx="8228520" cy="1141920"/>
+            <a:ext cx="8227800" cy="1141200"/>
           </a:xfrm>
           <a:prstGeom prst="rect">
             <a:avLst/>
@@ -1332,7 +1331,7 @@
         <p:spPr>
           <a:xfrm>
             <a:off x="457200" y="1604520"/>
-            <a:ext cx="4015440" cy="904320"/>
+            <a:ext cx="955440" cy="205200"/>
           </a:xfrm>
           <a:prstGeom prst="rect">
             <a:avLst/>
@@ -1344,7 +1343,7 @@
         </p:spPr>
         <p:txBody>
           <a:bodyPr lIns="0" rIns="0" tIns="0" bIns="0" anchor="t">
-            <a:normAutofit/>
+            <a:normAutofit fontScale="24997" lnSpcReduction="10000"/>
           </a:bodyPr>
           <a:p>
             <a:pPr indent="0">
@@ -1374,8 +1373,8 @@
         </p:nvSpPr>
         <p:spPr>
           <a:xfrm>
-            <a:off x="457200" y="2595240"/>
-            <a:ext cx="4015440" cy="904320"/>
+            <a:off x="457200" y="1829520"/>
+            <a:ext cx="955440" cy="205200"/>
           </a:xfrm>
           <a:prstGeom prst="rect">
             <a:avLst/>
@@ -1387,7 +1386,7 @@
         </p:spPr>
         <p:txBody>
           <a:bodyPr lIns="0" rIns="0" tIns="0" bIns="0" anchor="t">
-            <a:normAutofit/>
+            <a:normAutofit fontScale="24997" lnSpcReduction="10000"/>
           </a:bodyPr>
           <a:p>
             <a:pPr indent="0">
@@ -1439,7 +1438,7 @@
         <p:txBody>
           <a:bodyPr/>
           <a:p>
-            <a:fld id="{B299AB32-E313-472E-B144-29856A94EF7C}" type="slidenum">
+            <a:fld id="{980A551E-10A1-4959-B138-16D58685BB13}" type="slidenum">
               <a:t>&lt;#&gt;</a:t>
             </a:fld>
           </a:p>
@@ -1501,7 +1500,7 @@
         <p:spPr>
           <a:xfrm>
             <a:off x="457200" y="274680"/>
-            <a:ext cx="8228520" cy="1141920"/>
+            <a:ext cx="8227800" cy="1141200"/>
           </a:xfrm>
           <a:prstGeom prst="rect">
             <a:avLst/>
@@ -1541,7 +1540,7 @@
         <p:spPr>
           <a:xfrm>
             <a:off x="457200" y="1604520"/>
-            <a:ext cx="1959480" cy="904320"/>
+            <a:ext cx="466200" cy="205200"/>
           </a:xfrm>
           <a:prstGeom prst="rect">
             <a:avLst/>
@@ -1553,7 +1552,7 @@
         </p:spPr>
         <p:txBody>
           <a:bodyPr lIns="0" rIns="0" tIns="0" bIns="0" anchor="t">
-            <a:normAutofit fontScale="96865"/>
+            <a:normAutofit fontScale="6249"/>
           </a:bodyPr>
           <a:p>
             <a:pPr indent="0">
@@ -1583,8 +1582,8 @@
         </p:nvSpPr>
         <p:spPr>
           <a:xfrm>
-            <a:off x="2514960" y="1604520"/>
-            <a:ext cx="1959480" cy="904320"/>
+            <a:off x="947160" y="1604520"/>
+            <a:ext cx="466200" cy="205200"/>
           </a:xfrm>
           <a:prstGeom prst="rect">
             <a:avLst/>
@@ -1596,7 +1595,7 @@
         </p:spPr>
         <p:txBody>
           <a:bodyPr lIns="0" rIns="0" tIns="0" bIns="0" anchor="t">
-            <a:normAutofit fontScale="96865"/>
+            <a:normAutofit fontScale="6249"/>
           </a:bodyPr>
           <a:p>
             <a:pPr indent="0">
@@ -1626,8 +1625,8 @@
         </p:nvSpPr>
         <p:spPr>
           <a:xfrm>
-            <a:off x="457200" y="2595240"/>
-            <a:ext cx="1959480" cy="904320"/>
+            <a:off x="457200" y="1829520"/>
+            <a:ext cx="466200" cy="205200"/>
           </a:xfrm>
           <a:prstGeom prst="rect">
             <a:avLst/>
@@ -1639,7 +1638,7 @@
         </p:spPr>
         <p:txBody>
           <a:bodyPr lIns="0" rIns="0" tIns="0" bIns="0" anchor="t">
-            <a:normAutofit fontScale="96865"/>
+            <a:normAutofit fontScale="6249"/>
           </a:bodyPr>
           <a:p>
             <a:pPr indent="0">
@@ -1669,8 +1668,8 @@
         </p:nvSpPr>
         <p:spPr>
           <a:xfrm>
-            <a:off x="2514960" y="2595240"/>
-            <a:ext cx="1959480" cy="904320"/>
+            <a:off x="947160" y="1829520"/>
+            <a:ext cx="466200" cy="205200"/>
           </a:xfrm>
           <a:prstGeom prst="rect">
             <a:avLst/>
@@ -1682,7 +1681,7 @@
         </p:spPr>
         <p:txBody>
           <a:bodyPr lIns="0" rIns="0" tIns="0" bIns="0" anchor="t">
-            <a:normAutofit fontScale="96865"/>
+            <a:normAutofit fontScale="6249"/>
           </a:bodyPr>
           <a:p>
             <a:pPr indent="0">
@@ -1734,7 +1733,7 @@
         <p:txBody>
           <a:bodyPr/>
           <a:p>
-            <a:fld id="{536816C3-1AB0-4B1E-AE36-0EDB861D028E}" type="slidenum">
+            <a:fld id="{6B062047-1853-47DA-80C3-D89A26B5CA9A}" type="slidenum">
               <a:t>&lt;#&gt;</a:t>
             </a:fld>
           </a:p>
@@ -1796,7 +1795,7 @@
         <p:spPr>
           <a:xfrm>
             <a:off x="457200" y="274680"/>
-            <a:ext cx="8228520" cy="1141920"/>
+            <a:ext cx="8227800" cy="1141200"/>
           </a:xfrm>
           <a:prstGeom prst="rect">
             <a:avLst/>
@@ -1836,7 +1835,7 @@
         <p:spPr>
           <a:xfrm>
             <a:off x="457200" y="1604520"/>
-            <a:ext cx="1292760" cy="904320"/>
+            <a:ext cx="307440" cy="205200"/>
           </a:xfrm>
           <a:prstGeom prst="rect">
             <a:avLst/>
@@ -1848,7 +1847,7 @@
         </p:spPr>
         <p:txBody>
           <a:bodyPr lIns="0" rIns="0" tIns="0" bIns="0" anchor="t">
-            <a:normAutofit fontScale="74992" lnSpcReduction="10000"/>
+            <a:normAutofit fontScale="3124" lnSpcReduction="10000"/>
           </a:bodyPr>
           <a:p>
             <a:pPr indent="0">
@@ -1878,8 +1877,8 @@
         </p:nvSpPr>
         <p:spPr>
           <a:xfrm>
-            <a:off x="1815120" y="1604520"/>
-            <a:ext cx="1292760" cy="904320"/>
+            <a:off x="780480" y="1604520"/>
+            <a:ext cx="307440" cy="205200"/>
           </a:xfrm>
           <a:prstGeom prst="rect">
             <a:avLst/>
@@ -1891,7 +1890,7 @@
         </p:spPr>
         <p:txBody>
           <a:bodyPr lIns="0" rIns="0" tIns="0" bIns="0" anchor="t">
-            <a:normAutofit fontScale="74992" lnSpcReduction="10000"/>
+            <a:normAutofit fontScale="3124" lnSpcReduction="10000"/>
           </a:bodyPr>
           <a:p>
             <a:pPr indent="0">
@@ -1921,8 +1920,8 @@
         </p:nvSpPr>
         <p:spPr>
           <a:xfrm>
-            <a:off x="3172680" y="1604520"/>
-            <a:ext cx="1292760" cy="904320"/>
+            <a:off x="1103760" y="1604520"/>
+            <a:ext cx="307440" cy="205200"/>
           </a:xfrm>
           <a:prstGeom prst="rect">
             <a:avLst/>
@@ -1934,7 +1933,7 @@
         </p:spPr>
         <p:txBody>
           <a:bodyPr lIns="0" rIns="0" tIns="0" bIns="0" anchor="t">
-            <a:normAutofit fontScale="74992" lnSpcReduction="10000"/>
+            <a:normAutofit fontScale="3124" lnSpcReduction="10000"/>
           </a:bodyPr>
           <a:p>
             <a:pPr indent="0">
@@ -1964,8 +1963,8 @@
         </p:nvSpPr>
         <p:spPr>
           <a:xfrm>
-            <a:off x="457200" y="2595240"/>
-            <a:ext cx="1292760" cy="904320"/>
+            <a:off x="457200" y="1829520"/>
+            <a:ext cx="307440" cy="205200"/>
           </a:xfrm>
           <a:prstGeom prst="rect">
             <a:avLst/>
@@ -1977,7 +1976,7 @@
         </p:spPr>
         <p:txBody>
           <a:bodyPr lIns="0" rIns="0" tIns="0" bIns="0" anchor="t">
-            <a:normAutofit fontScale="74992" lnSpcReduction="10000"/>
+            <a:normAutofit fontScale="3124" lnSpcReduction="10000"/>
           </a:bodyPr>
           <a:p>
             <a:pPr indent="0">
@@ -2007,8 +2006,8 @@
         </p:nvSpPr>
         <p:spPr>
           <a:xfrm>
-            <a:off x="1815120" y="2595240"/>
-            <a:ext cx="1292760" cy="904320"/>
+            <a:off x="780480" y="1829520"/>
+            <a:ext cx="307440" cy="205200"/>
           </a:xfrm>
           <a:prstGeom prst="rect">
             <a:avLst/>
@@ -2020,7 +2019,7 @@
         </p:spPr>
         <p:txBody>
           <a:bodyPr lIns="0" rIns="0" tIns="0" bIns="0" anchor="t">
-            <a:normAutofit fontScale="74992" lnSpcReduction="10000"/>
+            <a:normAutofit fontScale="3124" lnSpcReduction="10000"/>
           </a:bodyPr>
           <a:p>
             <a:pPr indent="0">
@@ -2050,8 +2049,8 @@
         </p:nvSpPr>
         <p:spPr>
           <a:xfrm>
-            <a:off x="3172680" y="2595240"/>
-            <a:ext cx="1292760" cy="904320"/>
+            <a:off x="1103760" y="1829520"/>
+            <a:ext cx="307440" cy="205200"/>
           </a:xfrm>
           <a:prstGeom prst="rect">
             <a:avLst/>
@@ -2063,7 +2062,7 @@
         </p:spPr>
         <p:txBody>
           <a:bodyPr lIns="0" rIns="0" tIns="0" bIns="0" anchor="t">
-            <a:normAutofit fontScale="74992" lnSpcReduction="10000"/>
+            <a:normAutofit fontScale="3124" lnSpcReduction="10000"/>
           </a:bodyPr>
           <a:p>
             <a:pPr indent="0">
@@ -2115,7 +2114,7 @@
         <p:txBody>
           <a:bodyPr/>
           <a:p>
-            <a:fld id="{A1A42534-AB7B-448C-8362-DBC77B960F87}" type="slidenum">
+            <a:fld id="{19AC2117-0BF1-47A6-AF4E-02E1890ED978}" type="slidenum">
               <a:t>&lt;#&gt;</a:t>
             </a:fld>
           </a:p>
@@ -2129,1123 +2128,6 @@
           </p:cNvSpPr>
           <p:nvPr>
             <p:ph type="dt" idx="3"/>
-          </p:nvPr>
-        </p:nvSpPr>
-        <p:spPr/>
-        <p:txBody>
-          <a:bodyPr/>
-          <a:p>
-            <a:r>
-              <a:rPr lang="en-US"/>
-              <a:t/>
-            </a:r>
-          </a:p>
-        </p:txBody>
-      </p:sp>
-    </p:spTree>
-  </p:cSld>
-</p:sldLayout>
-</file>
-
-<file path=ppt/slideLayouts/slideLayout13.xml><?xml version="1.0" encoding="utf-8"?>
-<p:sldLayout xmlns:a="http://schemas.openxmlformats.org/drawingml/2006/main" xmlns:p="http://schemas.openxmlformats.org/presentationml/2006/main" xmlns:r="http://schemas.openxmlformats.org/officeDocument/2006/relationships" xmlns:p14="http://schemas.microsoft.com/office/powerpoint/2010/main" xmlns:p15="http://schemas.microsoft.com/office/powerpoint/2012/main" xmlns:mc="http://schemas.openxmlformats.org/markup-compatibility/2006" type="blank" preserve="1">
-  <p:cSld name="Blank Slide">
-    <p:spTree>
-      <p:nvGrpSpPr>
-        <p:cNvPr id="1" name=""/>
-        <p:cNvGrpSpPr/>
-        <p:nvPr/>
-      </p:nvGrpSpPr>
-      <p:grpSpPr>
-        <a:xfrm>
-          <a:off x="0" y="0"/>
-          <a:ext cx="0" cy="0"/>
-          <a:chOff x="0" y="0"/>
-          <a:chExt cx="0" cy="0"/>
-        </a:xfrm>
-      </p:grpSpPr>
-      <p:sp>
-        <p:nvSpPr>
-          <p:cNvPr id="2" name="PlaceHolder 1"/>
-          <p:cNvSpPr>
-            <a:spLocks noGrp="1"/>
-          </p:cNvSpPr>
-          <p:nvPr>
-            <p:ph type="ftr" idx="4"/>
-          </p:nvPr>
-        </p:nvSpPr>
-        <p:spPr/>
-        <p:txBody>
-          <a:bodyPr/>
-          <a:p>
-            <a:r>
-              <a:t>Footer</a:t>
-            </a:r>
-          </a:p>
-        </p:txBody>
-      </p:sp>
-      <p:sp>
-        <p:nvSpPr>
-          <p:cNvPr id="3" name="PlaceHolder 2"/>
-          <p:cNvSpPr>
-            <a:spLocks noGrp="1"/>
-          </p:cNvSpPr>
-          <p:nvPr>
-            <p:ph type="sldNum" idx="5"/>
-          </p:nvPr>
-        </p:nvSpPr>
-        <p:spPr/>
-        <p:txBody>
-          <a:bodyPr/>
-          <a:p>
-            <a:fld id="{EEDB778D-FA47-438C-8418-A7C733B2565B}" type="slidenum">
-              <a:t>&lt;#&gt;</a:t>
-            </a:fld>
-          </a:p>
-        </p:txBody>
-      </p:sp>
-      <p:sp>
-        <p:nvSpPr>
-          <p:cNvPr id="4" name="PlaceHolder 3"/>
-          <p:cNvSpPr>
-            <a:spLocks noGrp="1"/>
-          </p:cNvSpPr>
-          <p:nvPr>
-            <p:ph type="dt" idx="6"/>
-          </p:nvPr>
-        </p:nvSpPr>
-        <p:spPr/>
-        <p:txBody>
-          <a:bodyPr/>
-          <a:p>
-            <a:r>
-              <a:rPr lang="en-US"/>
-              <a:t/>
-            </a:r>
-          </a:p>
-        </p:txBody>
-      </p:sp>
-    </p:spTree>
-  </p:cSld>
-</p:sldLayout>
-</file>
-
-<file path=ppt/slideLayouts/slideLayout14.xml><?xml version="1.0" encoding="utf-8"?>
-<p:sldLayout xmlns:a="http://schemas.openxmlformats.org/drawingml/2006/main" xmlns:p="http://schemas.openxmlformats.org/presentationml/2006/main" xmlns:r="http://schemas.openxmlformats.org/officeDocument/2006/relationships" xmlns:p14="http://schemas.microsoft.com/office/powerpoint/2010/main" xmlns:p15="http://schemas.microsoft.com/office/powerpoint/2012/main" xmlns:mc="http://schemas.openxmlformats.org/markup-compatibility/2006" type="tx" preserve="1">
-  <p:cSld name="Title Slide">
-    <p:spTree>
-      <p:nvGrpSpPr>
-        <p:cNvPr id="1" name=""/>
-        <p:cNvGrpSpPr/>
-        <p:nvPr/>
-      </p:nvGrpSpPr>
-      <p:grpSpPr>
-        <a:xfrm>
-          <a:off x="0" y="0"/>
-          <a:ext cx="0" cy="0"/>
-          <a:chOff x="0" y="0"/>
-          <a:chExt cx="0" cy="0"/>
-        </a:xfrm>
-      </p:grpSpPr>
-      <p:sp>
-        <p:nvSpPr>
-          <p:cNvPr id="48" name="PlaceHolder 1"/>
-          <p:cNvSpPr>
-            <a:spLocks noGrp="1"/>
-          </p:cNvSpPr>
-          <p:nvPr>
-            <p:ph type="title"/>
-          </p:nvPr>
-        </p:nvSpPr>
-        <p:spPr>
-          <a:xfrm>
-            <a:off x="457200" y="274680"/>
-            <a:ext cx="8228520" cy="1141920"/>
-          </a:xfrm>
-          <a:prstGeom prst="rect">
-            <a:avLst/>
-          </a:prstGeom>
-          <a:noFill/>
-          <a:ln w="0">
-            <a:noFill/>
-          </a:ln>
-        </p:spPr>
-        <p:txBody>
-          <a:bodyPr lIns="0" rIns="0" tIns="0" bIns="0" anchor="ctr">
-            <a:noAutofit/>
-          </a:bodyPr>
-          <a:p>
-            <a:pPr indent="0" algn="ctr">
-              <a:buNone/>
-            </a:pPr>
-            <a:endParaRPr b="0" lang="en-US" sz="4400" spc="-1" strike="noStrike">
-              <a:solidFill>
-                <a:srgbClr val="000000"/>
-              </a:solidFill>
-              <a:latin typeface="Arial"/>
-            </a:endParaRPr>
-          </a:p>
-        </p:txBody>
-      </p:sp>
-      <p:sp>
-        <p:nvSpPr>
-          <p:cNvPr id="49" name="PlaceHolder 2"/>
-          <p:cNvSpPr>
-            <a:spLocks noGrp="1"/>
-          </p:cNvSpPr>
-          <p:nvPr>
-            <p:ph type="subTitle"/>
-          </p:nvPr>
-        </p:nvSpPr>
-        <p:spPr>
-          <a:xfrm>
-            <a:off x="457200" y="1604520"/>
-            <a:ext cx="4015440" cy="1896480"/>
-          </a:xfrm>
-          <a:prstGeom prst="rect">
-            <a:avLst/>
-          </a:prstGeom>
-          <a:noFill/>
-          <a:ln w="0">
-            <a:noFill/>
-          </a:ln>
-        </p:spPr>
-        <p:txBody>
-          <a:bodyPr lIns="0" rIns="0" tIns="0" bIns="0" anchor="ctr">
-            <a:noAutofit/>
-          </a:bodyPr>
-          <a:p>
-            <a:pPr indent="0" algn="ctr">
-              <a:buNone/>
-            </a:pPr>
-            <a:endParaRPr b="0" lang="en-US" sz="3200" spc="-1" strike="noStrike">
-              <a:solidFill>
-                <a:srgbClr val="000000"/>
-              </a:solidFill>
-              <a:latin typeface="Arial"/>
-            </a:endParaRPr>
-          </a:p>
-        </p:txBody>
-      </p:sp>
-      <p:sp>
-        <p:nvSpPr>
-          <p:cNvPr id="4" name="PlaceHolder 3"/>
-          <p:cNvSpPr>
-            <a:spLocks noGrp="1"/>
-          </p:cNvSpPr>
-          <p:nvPr>
-            <p:ph type="ftr" idx="4"/>
-          </p:nvPr>
-        </p:nvSpPr>
-        <p:spPr/>
-        <p:txBody>
-          <a:bodyPr/>
-          <a:p>
-            <a:r>
-              <a:t>Footer</a:t>
-            </a:r>
-          </a:p>
-        </p:txBody>
-      </p:sp>
-      <p:sp>
-        <p:nvSpPr>
-          <p:cNvPr id="5" name="PlaceHolder 4"/>
-          <p:cNvSpPr>
-            <a:spLocks noGrp="1"/>
-          </p:cNvSpPr>
-          <p:nvPr>
-            <p:ph type="sldNum" idx="5"/>
-          </p:nvPr>
-        </p:nvSpPr>
-        <p:spPr/>
-        <p:txBody>
-          <a:bodyPr/>
-          <a:p>
-            <a:fld id="{8B642318-C803-4770-B0A8-3BCD24A50517}" type="slidenum">
-              <a:t>&lt;#&gt;</a:t>
-            </a:fld>
-          </a:p>
-        </p:txBody>
-      </p:sp>
-      <p:sp>
-        <p:nvSpPr>
-          <p:cNvPr id="6" name="PlaceHolder 5"/>
-          <p:cNvSpPr>
-            <a:spLocks noGrp="1"/>
-          </p:cNvSpPr>
-          <p:nvPr>
-            <p:ph type="dt" idx="6"/>
-          </p:nvPr>
-        </p:nvSpPr>
-        <p:spPr/>
-        <p:txBody>
-          <a:bodyPr/>
-          <a:p>
-            <a:r>
-              <a:rPr lang="en-US"/>
-              <a:t/>
-            </a:r>
-          </a:p>
-        </p:txBody>
-      </p:sp>
-    </p:spTree>
-  </p:cSld>
-</p:sldLayout>
-</file>
-
-<file path=ppt/slideLayouts/slideLayout15.xml><?xml version="1.0" encoding="utf-8"?>
-<p:sldLayout xmlns:a="http://schemas.openxmlformats.org/drawingml/2006/main" xmlns:p="http://schemas.openxmlformats.org/presentationml/2006/main" xmlns:r="http://schemas.openxmlformats.org/officeDocument/2006/relationships" xmlns:p14="http://schemas.microsoft.com/office/powerpoint/2010/main" xmlns:p15="http://schemas.microsoft.com/office/powerpoint/2012/main" xmlns:mc="http://schemas.openxmlformats.org/markup-compatibility/2006" type="obj" preserve="1">
-  <p:cSld name="Title, Content">
-    <p:spTree>
-      <p:nvGrpSpPr>
-        <p:cNvPr id="1" name=""/>
-        <p:cNvGrpSpPr/>
-        <p:nvPr/>
-      </p:nvGrpSpPr>
-      <p:grpSpPr>
-        <a:xfrm>
-          <a:off x="0" y="0"/>
-          <a:ext cx="0" cy="0"/>
-          <a:chOff x="0" y="0"/>
-          <a:chExt cx="0" cy="0"/>
-        </a:xfrm>
-      </p:grpSpPr>
-      <p:sp>
-        <p:nvSpPr>
-          <p:cNvPr id="50" name="PlaceHolder 1"/>
-          <p:cNvSpPr>
-            <a:spLocks noGrp="1"/>
-          </p:cNvSpPr>
-          <p:nvPr>
-            <p:ph type="title"/>
-          </p:nvPr>
-        </p:nvSpPr>
-        <p:spPr>
-          <a:xfrm>
-            <a:off x="457200" y="274680"/>
-            <a:ext cx="8228520" cy="1141920"/>
-          </a:xfrm>
-          <a:prstGeom prst="rect">
-            <a:avLst/>
-          </a:prstGeom>
-          <a:noFill/>
-          <a:ln w="0">
-            <a:noFill/>
-          </a:ln>
-        </p:spPr>
-        <p:txBody>
-          <a:bodyPr lIns="0" rIns="0" tIns="0" bIns="0" anchor="ctr">
-            <a:noAutofit/>
-          </a:bodyPr>
-          <a:p>
-            <a:pPr indent="0" algn="ctr">
-              <a:buNone/>
-            </a:pPr>
-            <a:endParaRPr b="0" lang="en-US" sz="4400" spc="-1" strike="noStrike">
-              <a:solidFill>
-                <a:srgbClr val="000000"/>
-              </a:solidFill>
-              <a:latin typeface="Arial"/>
-            </a:endParaRPr>
-          </a:p>
-        </p:txBody>
-      </p:sp>
-      <p:sp>
-        <p:nvSpPr>
-          <p:cNvPr id="51" name="PlaceHolder 2"/>
-          <p:cNvSpPr>
-            <a:spLocks noGrp="1"/>
-          </p:cNvSpPr>
-          <p:nvPr>
-            <p:ph/>
-          </p:nvPr>
-        </p:nvSpPr>
-        <p:spPr>
-          <a:xfrm>
-            <a:off x="457200" y="1604520"/>
-            <a:ext cx="4015440" cy="1896480"/>
-          </a:xfrm>
-          <a:prstGeom prst="rect">
-            <a:avLst/>
-          </a:prstGeom>
-          <a:noFill/>
-          <a:ln w="0">
-            <a:noFill/>
-          </a:ln>
-        </p:spPr>
-        <p:txBody>
-          <a:bodyPr lIns="0" rIns="0" tIns="0" bIns="0" anchor="t">
-            <a:normAutofit/>
-          </a:bodyPr>
-          <a:p>
-            <a:pPr indent="0">
-              <a:spcBef>
-                <a:spcPts val="1417"/>
-              </a:spcBef>
-              <a:buNone/>
-            </a:pPr>
-            <a:endParaRPr b="0" lang="en-US" sz="3200" spc="-1" strike="noStrike">
-              <a:solidFill>
-                <a:srgbClr val="000000"/>
-              </a:solidFill>
-              <a:latin typeface="Arial"/>
-            </a:endParaRPr>
-          </a:p>
-        </p:txBody>
-      </p:sp>
-      <p:sp>
-        <p:nvSpPr>
-          <p:cNvPr id="4" name="PlaceHolder 3"/>
-          <p:cNvSpPr>
-            <a:spLocks noGrp="1"/>
-          </p:cNvSpPr>
-          <p:nvPr>
-            <p:ph type="ftr" idx="4"/>
-          </p:nvPr>
-        </p:nvSpPr>
-        <p:spPr/>
-        <p:txBody>
-          <a:bodyPr/>
-          <a:p>
-            <a:r>
-              <a:t>Footer</a:t>
-            </a:r>
-          </a:p>
-        </p:txBody>
-      </p:sp>
-      <p:sp>
-        <p:nvSpPr>
-          <p:cNvPr id="5" name="PlaceHolder 4"/>
-          <p:cNvSpPr>
-            <a:spLocks noGrp="1"/>
-          </p:cNvSpPr>
-          <p:nvPr>
-            <p:ph type="sldNum" idx="5"/>
-          </p:nvPr>
-        </p:nvSpPr>
-        <p:spPr/>
-        <p:txBody>
-          <a:bodyPr/>
-          <a:p>
-            <a:fld id="{CA03EF1D-866B-4BF2-8371-E7FC9F4AAD3F}" type="slidenum">
-              <a:t>&lt;#&gt;</a:t>
-            </a:fld>
-          </a:p>
-        </p:txBody>
-      </p:sp>
-      <p:sp>
-        <p:nvSpPr>
-          <p:cNvPr id="6" name="PlaceHolder 5"/>
-          <p:cNvSpPr>
-            <a:spLocks noGrp="1"/>
-          </p:cNvSpPr>
-          <p:nvPr>
-            <p:ph type="dt" idx="6"/>
-          </p:nvPr>
-        </p:nvSpPr>
-        <p:spPr/>
-        <p:txBody>
-          <a:bodyPr/>
-          <a:p>
-            <a:r>
-              <a:rPr lang="en-US"/>
-              <a:t/>
-            </a:r>
-          </a:p>
-        </p:txBody>
-      </p:sp>
-    </p:spTree>
-  </p:cSld>
-</p:sldLayout>
-</file>
-
-<file path=ppt/slideLayouts/slideLayout16.xml><?xml version="1.0" encoding="utf-8"?>
-<p:sldLayout xmlns:a="http://schemas.openxmlformats.org/drawingml/2006/main" xmlns:p="http://schemas.openxmlformats.org/presentationml/2006/main" xmlns:r="http://schemas.openxmlformats.org/officeDocument/2006/relationships" xmlns:p14="http://schemas.microsoft.com/office/powerpoint/2010/main" xmlns:p15="http://schemas.microsoft.com/office/powerpoint/2012/main" xmlns:mc="http://schemas.openxmlformats.org/markup-compatibility/2006" type="twoObj" preserve="1">
-  <p:cSld name="Title, 2 Content">
-    <p:spTree>
-      <p:nvGrpSpPr>
-        <p:cNvPr id="1" name=""/>
-        <p:cNvGrpSpPr/>
-        <p:nvPr/>
-      </p:nvGrpSpPr>
-      <p:grpSpPr>
-        <a:xfrm>
-          <a:off x="0" y="0"/>
-          <a:ext cx="0" cy="0"/>
-          <a:chOff x="0" y="0"/>
-          <a:chExt cx="0" cy="0"/>
-        </a:xfrm>
-      </p:grpSpPr>
-      <p:sp>
-        <p:nvSpPr>
-          <p:cNvPr id="52" name="PlaceHolder 1"/>
-          <p:cNvSpPr>
-            <a:spLocks noGrp="1"/>
-          </p:cNvSpPr>
-          <p:nvPr>
-            <p:ph type="title"/>
-          </p:nvPr>
-        </p:nvSpPr>
-        <p:spPr>
-          <a:xfrm>
-            <a:off x="457200" y="274680"/>
-            <a:ext cx="8228520" cy="1141920"/>
-          </a:xfrm>
-          <a:prstGeom prst="rect">
-            <a:avLst/>
-          </a:prstGeom>
-          <a:noFill/>
-          <a:ln w="0">
-            <a:noFill/>
-          </a:ln>
-        </p:spPr>
-        <p:txBody>
-          <a:bodyPr lIns="0" rIns="0" tIns="0" bIns="0" anchor="ctr">
-            <a:noAutofit/>
-          </a:bodyPr>
-          <a:p>
-            <a:pPr indent="0" algn="ctr">
-              <a:buNone/>
-            </a:pPr>
-            <a:endParaRPr b="0" lang="en-US" sz="4400" spc="-1" strike="noStrike">
-              <a:solidFill>
-                <a:srgbClr val="000000"/>
-              </a:solidFill>
-              <a:latin typeface="Arial"/>
-            </a:endParaRPr>
-          </a:p>
-        </p:txBody>
-      </p:sp>
-      <p:sp>
-        <p:nvSpPr>
-          <p:cNvPr id="53" name="PlaceHolder 2"/>
-          <p:cNvSpPr>
-            <a:spLocks noGrp="1"/>
-          </p:cNvSpPr>
-          <p:nvPr>
-            <p:ph/>
-          </p:nvPr>
-        </p:nvSpPr>
-        <p:spPr>
-          <a:xfrm>
-            <a:off x="457200" y="1604520"/>
-            <a:ext cx="1959480" cy="1896480"/>
-          </a:xfrm>
-          <a:prstGeom prst="rect">
-            <a:avLst/>
-          </a:prstGeom>
-          <a:noFill/>
-          <a:ln w="0">
-            <a:noFill/>
-          </a:ln>
-        </p:spPr>
-        <p:txBody>
-          <a:bodyPr lIns="0" rIns="0" tIns="0" bIns="0" anchor="t">
-            <a:normAutofit/>
-          </a:bodyPr>
-          <a:p>
-            <a:pPr indent="0">
-              <a:spcBef>
-                <a:spcPts val="1417"/>
-              </a:spcBef>
-              <a:buNone/>
-            </a:pPr>
-            <a:endParaRPr b="0" lang="en-US" sz="3200" spc="-1" strike="noStrike">
-              <a:solidFill>
-                <a:srgbClr val="000000"/>
-              </a:solidFill>
-              <a:latin typeface="Arial"/>
-            </a:endParaRPr>
-          </a:p>
-        </p:txBody>
-      </p:sp>
-      <p:sp>
-        <p:nvSpPr>
-          <p:cNvPr id="54" name="PlaceHolder 3"/>
-          <p:cNvSpPr>
-            <a:spLocks noGrp="1"/>
-          </p:cNvSpPr>
-          <p:nvPr>
-            <p:ph/>
-          </p:nvPr>
-        </p:nvSpPr>
-        <p:spPr>
-          <a:xfrm>
-            <a:off x="2514960" y="1604520"/>
-            <a:ext cx="1959480" cy="1896480"/>
-          </a:xfrm>
-          <a:prstGeom prst="rect">
-            <a:avLst/>
-          </a:prstGeom>
-          <a:noFill/>
-          <a:ln w="0">
-            <a:noFill/>
-          </a:ln>
-        </p:spPr>
-        <p:txBody>
-          <a:bodyPr lIns="0" rIns="0" tIns="0" bIns="0" anchor="t">
-            <a:normAutofit/>
-          </a:bodyPr>
-          <a:p>
-            <a:pPr indent="0">
-              <a:spcBef>
-                <a:spcPts val="1417"/>
-              </a:spcBef>
-              <a:buNone/>
-            </a:pPr>
-            <a:endParaRPr b="0" lang="en-US" sz="3200" spc="-1" strike="noStrike">
-              <a:solidFill>
-                <a:srgbClr val="000000"/>
-              </a:solidFill>
-              <a:latin typeface="Arial"/>
-            </a:endParaRPr>
-          </a:p>
-        </p:txBody>
-      </p:sp>
-      <p:sp>
-        <p:nvSpPr>
-          <p:cNvPr id="5" name="PlaceHolder 4"/>
-          <p:cNvSpPr>
-            <a:spLocks noGrp="1"/>
-          </p:cNvSpPr>
-          <p:nvPr>
-            <p:ph type="ftr" idx="4"/>
-          </p:nvPr>
-        </p:nvSpPr>
-        <p:spPr/>
-        <p:txBody>
-          <a:bodyPr/>
-          <a:p>
-            <a:r>
-              <a:t>Footer</a:t>
-            </a:r>
-          </a:p>
-        </p:txBody>
-      </p:sp>
-      <p:sp>
-        <p:nvSpPr>
-          <p:cNvPr id="6" name="PlaceHolder 5"/>
-          <p:cNvSpPr>
-            <a:spLocks noGrp="1"/>
-          </p:cNvSpPr>
-          <p:nvPr>
-            <p:ph type="sldNum" idx="5"/>
-          </p:nvPr>
-        </p:nvSpPr>
-        <p:spPr/>
-        <p:txBody>
-          <a:bodyPr/>
-          <a:p>
-            <a:fld id="{86562ADA-7739-4FA1-B8ED-3C53F3A81961}" type="slidenum">
-              <a:t>&lt;#&gt;</a:t>
-            </a:fld>
-          </a:p>
-        </p:txBody>
-      </p:sp>
-      <p:sp>
-        <p:nvSpPr>
-          <p:cNvPr id="7" name="PlaceHolder 6"/>
-          <p:cNvSpPr>
-            <a:spLocks noGrp="1"/>
-          </p:cNvSpPr>
-          <p:nvPr>
-            <p:ph type="dt" idx="6"/>
-          </p:nvPr>
-        </p:nvSpPr>
-        <p:spPr/>
-        <p:txBody>
-          <a:bodyPr/>
-          <a:p>
-            <a:r>
-              <a:rPr lang="en-US"/>
-              <a:t/>
-            </a:r>
-          </a:p>
-        </p:txBody>
-      </p:sp>
-    </p:spTree>
-  </p:cSld>
-</p:sldLayout>
-</file>
-
-<file path=ppt/slideLayouts/slideLayout17.xml><?xml version="1.0" encoding="utf-8"?>
-<p:sldLayout xmlns:a="http://schemas.openxmlformats.org/drawingml/2006/main" xmlns:p="http://schemas.openxmlformats.org/presentationml/2006/main" xmlns:r="http://schemas.openxmlformats.org/officeDocument/2006/relationships" xmlns:p14="http://schemas.microsoft.com/office/powerpoint/2010/main" xmlns:p15="http://schemas.microsoft.com/office/powerpoint/2012/main" xmlns:mc="http://schemas.openxmlformats.org/markup-compatibility/2006" type="titleOnly" preserve="1">
-  <p:cSld name="Title Only">
-    <p:spTree>
-      <p:nvGrpSpPr>
-        <p:cNvPr id="1" name=""/>
-        <p:cNvGrpSpPr/>
-        <p:nvPr/>
-      </p:nvGrpSpPr>
-      <p:grpSpPr>
-        <a:xfrm>
-          <a:off x="0" y="0"/>
-          <a:ext cx="0" cy="0"/>
-          <a:chOff x="0" y="0"/>
-          <a:chExt cx="0" cy="0"/>
-        </a:xfrm>
-      </p:grpSpPr>
-      <p:sp>
-        <p:nvSpPr>
-          <p:cNvPr id="55" name="PlaceHolder 1"/>
-          <p:cNvSpPr>
-            <a:spLocks noGrp="1"/>
-          </p:cNvSpPr>
-          <p:nvPr>
-            <p:ph type="title"/>
-          </p:nvPr>
-        </p:nvSpPr>
-        <p:spPr>
-          <a:xfrm>
-            <a:off x="457200" y="274680"/>
-            <a:ext cx="8228520" cy="1141920"/>
-          </a:xfrm>
-          <a:prstGeom prst="rect">
-            <a:avLst/>
-          </a:prstGeom>
-          <a:noFill/>
-          <a:ln w="0">
-            <a:noFill/>
-          </a:ln>
-        </p:spPr>
-        <p:txBody>
-          <a:bodyPr lIns="0" rIns="0" tIns="0" bIns="0" anchor="ctr">
-            <a:noAutofit/>
-          </a:bodyPr>
-          <a:p>
-            <a:pPr indent="0" algn="ctr">
-              <a:buNone/>
-            </a:pPr>
-            <a:endParaRPr b="0" lang="en-US" sz="4400" spc="-1" strike="noStrike">
-              <a:solidFill>
-                <a:srgbClr val="000000"/>
-              </a:solidFill>
-              <a:latin typeface="Arial"/>
-            </a:endParaRPr>
-          </a:p>
-        </p:txBody>
-      </p:sp>
-      <p:sp>
-        <p:nvSpPr>
-          <p:cNvPr id="3" name="PlaceHolder 2"/>
-          <p:cNvSpPr>
-            <a:spLocks noGrp="1"/>
-          </p:cNvSpPr>
-          <p:nvPr>
-            <p:ph type="ftr" idx="4"/>
-          </p:nvPr>
-        </p:nvSpPr>
-        <p:spPr/>
-        <p:txBody>
-          <a:bodyPr/>
-          <a:p>
-            <a:r>
-              <a:t>Footer</a:t>
-            </a:r>
-          </a:p>
-        </p:txBody>
-      </p:sp>
-      <p:sp>
-        <p:nvSpPr>
-          <p:cNvPr id="4" name="PlaceHolder 3"/>
-          <p:cNvSpPr>
-            <a:spLocks noGrp="1"/>
-          </p:cNvSpPr>
-          <p:nvPr>
-            <p:ph type="sldNum" idx="5"/>
-          </p:nvPr>
-        </p:nvSpPr>
-        <p:spPr/>
-        <p:txBody>
-          <a:bodyPr/>
-          <a:p>
-            <a:fld id="{1692D450-63E4-482C-8E55-D71D7B186827}" type="slidenum">
-              <a:t>&lt;#&gt;</a:t>
-            </a:fld>
-          </a:p>
-        </p:txBody>
-      </p:sp>
-      <p:sp>
-        <p:nvSpPr>
-          <p:cNvPr id="5" name="PlaceHolder 4"/>
-          <p:cNvSpPr>
-            <a:spLocks noGrp="1"/>
-          </p:cNvSpPr>
-          <p:nvPr>
-            <p:ph type="dt" idx="6"/>
-          </p:nvPr>
-        </p:nvSpPr>
-        <p:spPr/>
-        <p:txBody>
-          <a:bodyPr/>
-          <a:p>
-            <a:r>
-              <a:rPr lang="en-US"/>
-              <a:t/>
-            </a:r>
-          </a:p>
-        </p:txBody>
-      </p:sp>
-    </p:spTree>
-  </p:cSld>
-</p:sldLayout>
-</file>
-
-<file path=ppt/slideLayouts/slideLayout18.xml><?xml version="1.0" encoding="utf-8"?>
-<p:sldLayout xmlns:a="http://schemas.openxmlformats.org/drawingml/2006/main" xmlns:p="http://schemas.openxmlformats.org/presentationml/2006/main" xmlns:r="http://schemas.openxmlformats.org/officeDocument/2006/relationships" xmlns:p14="http://schemas.microsoft.com/office/powerpoint/2010/main" xmlns:p15="http://schemas.microsoft.com/office/powerpoint/2012/main" xmlns:mc="http://schemas.openxmlformats.org/markup-compatibility/2006" type="objOnly" preserve="1">
-  <p:cSld name="Centered Text">
-    <p:spTree>
-      <p:nvGrpSpPr>
-        <p:cNvPr id="1" name=""/>
-        <p:cNvGrpSpPr/>
-        <p:nvPr/>
-      </p:nvGrpSpPr>
-      <p:grpSpPr>
-        <a:xfrm>
-          <a:off x="0" y="0"/>
-          <a:ext cx="0" cy="0"/>
-          <a:chOff x="0" y="0"/>
-          <a:chExt cx="0" cy="0"/>
-        </a:xfrm>
-      </p:grpSpPr>
-      <p:sp>
-        <p:nvSpPr>
-          <p:cNvPr id="56" name="PlaceHolder 1"/>
-          <p:cNvSpPr>
-            <a:spLocks noGrp="1"/>
-          </p:cNvSpPr>
-          <p:nvPr>
-            <p:ph type="subTitle"/>
-          </p:nvPr>
-        </p:nvSpPr>
-        <p:spPr>
-          <a:xfrm>
-            <a:off x="457200" y="274680"/>
-            <a:ext cx="8228520" cy="5294520"/>
-          </a:xfrm>
-          <a:prstGeom prst="rect">
-            <a:avLst/>
-          </a:prstGeom>
-          <a:noFill/>
-          <a:ln w="0">
-            <a:noFill/>
-          </a:ln>
-        </p:spPr>
-        <p:txBody>
-          <a:bodyPr lIns="0" rIns="0" tIns="0" bIns="0" anchor="ctr">
-            <a:noAutofit/>
-          </a:bodyPr>
-          <a:p>
-            <a:pPr algn="ctr"/>
-            <a:endParaRPr b="0" lang="en-US" sz="3200" spc="-1" strike="noStrike">
-              <a:solidFill>
-                <a:srgbClr val="000000"/>
-              </a:solidFill>
-              <a:latin typeface="Arial"/>
-            </a:endParaRPr>
-          </a:p>
-        </p:txBody>
-      </p:sp>
-      <p:sp>
-        <p:nvSpPr>
-          <p:cNvPr id="3" name="PlaceHolder 2"/>
-          <p:cNvSpPr>
-            <a:spLocks noGrp="1"/>
-          </p:cNvSpPr>
-          <p:nvPr>
-            <p:ph type="ftr" idx="4"/>
-          </p:nvPr>
-        </p:nvSpPr>
-        <p:spPr/>
-        <p:txBody>
-          <a:bodyPr/>
-          <a:p>
-            <a:r>
-              <a:t>Footer</a:t>
-            </a:r>
-          </a:p>
-        </p:txBody>
-      </p:sp>
-      <p:sp>
-        <p:nvSpPr>
-          <p:cNvPr id="4" name="PlaceHolder 3"/>
-          <p:cNvSpPr>
-            <a:spLocks noGrp="1"/>
-          </p:cNvSpPr>
-          <p:nvPr>
-            <p:ph type="sldNum" idx="5"/>
-          </p:nvPr>
-        </p:nvSpPr>
-        <p:spPr/>
-        <p:txBody>
-          <a:bodyPr/>
-          <a:p>
-            <a:fld id="{A5F50537-CD43-4DC9-9F60-9CB774013965}" type="slidenum">
-              <a:t>&lt;#&gt;</a:t>
-            </a:fld>
-          </a:p>
-        </p:txBody>
-      </p:sp>
-      <p:sp>
-        <p:nvSpPr>
-          <p:cNvPr id="5" name="PlaceHolder 4"/>
-          <p:cNvSpPr>
-            <a:spLocks noGrp="1"/>
-          </p:cNvSpPr>
-          <p:nvPr>
-            <p:ph type="dt" idx="6"/>
-          </p:nvPr>
-        </p:nvSpPr>
-        <p:spPr/>
-        <p:txBody>
-          <a:bodyPr/>
-          <a:p>
-            <a:r>
-              <a:rPr lang="en-US"/>
-              <a:t/>
-            </a:r>
-          </a:p>
-        </p:txBody>
-      </p:sp>
-    </p:spTree>
-  </p:cSld>
-</p:sldLayout>
-</file>
-
-<file path=ppt/slideLayouts/slideLayout19.xml><?xml version="1.0" encoding="utf-8"?>
-<p:sldLayout xmlns:a="http://schemas.openxmlformats.org/drawingml/2006/main" xmlns:p="http://schemas.openxmlformats.org/presentationml/2006/main" xmlns:r="http://schemas.openxmlformats.org/officeDocument/2006/relationships" xmlns:p14="http://schemas.microsoft.com/office/powerpoint/2010/main" xmlns:p15="http://schemas.microsoft.com/office/powerpoint/2012/main" xmlns:mc="http://schemas.openxmlformats.org/markup-compatibility/2006" type="twoObjAndObj" preserve="1">
-  <p:cSld name="Title, 2 Content and Content">
-    <p:spTree>
-      <p:nvGrpSpPr>
-        <p:cNvPr id="1" name=""/>
-        <p:cNvGrpSpPr/>
-        <p:nvPr/>
-      </p:nvGrpSpPr>
-      <p:grpSpPr>
-        <a:xfrm>
-          <a:off x="0" y="0"/>
-          <a:ext cx="0" cy="0"/>
-          <a:chOff x="0" y="0"/>
-          <a:chExt cx="0" cy="0"/>
-        </a:xfrm>
-      </p:grpSpPr>
-      <p:sp>
-        <p:nvSpPr>
-          <p:cNvPr id="57" name="PlaceHolder 1"/>
-          <p:cNvSpPr>
-            <a:spLocks noGrp="1"/>
-          </p:cNvSpPr>
-          <p:nvPr>
-            <p:ph type="title"/>
-          </p:nvPr>
-        </p:nvSpPr>
-        <p:spPr>
-          <a:xfrm>
-            <a:off x="457200" y="274680"/>
-            <a:ext cx="8228520" cy="1141920"/>
-          </a:xfrm>
-          <a:prstGeom prst="rect">
-            <a:avLst/>
-          </a:prstGeom>
-          <a:noFill/>
-          <a:ln w="0">
-            <a:noFill/>
-          </a:ln>
-        </p:spPr>
-        <p:txBody>
-          <a:bodyPr lIns="0" rIns="0" tIns="0" bIns="0" anchor="ctr">
-            <a:noAutofit/>
-          </a:bodyPr>
-          <a:p>
-            <a:pPr indent="0" algn="ctr">
-              <a:buNone/>
-            </a:pPr>
-            <a:endParaRPr b="0" lang="en-US" sz="4400" spc="-1" strike="noStrike">
-              <a:solidFill>
-                <a:srgbClr val="000000"/>
-              </a:solidFill>
-              <a:latin typeface="Arial"/>
-            </a:endParaRPr>
-          </a:p>
-        </p:txBody>
-      </p:sp>
-      <p:sp>
-        <p:nvSpPr>
-          <p:cNvPr id="58" name="PlaceHolder 2"/>
-          <p:cNvSpPr>
-            <a:spLocks noGrp="1"/>
-          </p:cNvSpPr>
-          <p:nvPr>
-            <p:ph/>
-          </p:nvPr>
-        </p:nvSpPr>
-        <p:spPr>
-          <a:xfrm>
-            <a:off x="457200" y="1604520"/>
-            <a:ext cx="1959480" cy="904320"/>
-          </a:xfrm>
-          <a:prstGeom prst="rect">
-            <a:avLst/>
-          </a:prstGeom>
-          <a:noFill/>
-          <a:ln w="0">
-            <a:noFill/>
-          </a:ln>
-        </p:spPr>
-        <p:txBody>
-          <a:bodyPr lIns="0" rIns="0" tIns="0" bIns="0" anchor="t">
-            <a:normAutofit fontScale="96865"/>
-          </a:bodyPr>
-          <a:p>
-            <a:pPr indent="0">
-              <a:spcBef>
-                <a:spcPts val="1417"/>
-              </a:spcBef>
-              <a:buNone/>
-            </a:pPr>
-            <a:endParaRPr b="0" lang="en-US" sz="3200" spc="-1" strike="noStrike">
-              <a:solidFill>
-                <a:srgbClr val="000000"/>
-              </a:solidFill>
-              <a:latin typeface="Arial"/>
-            </a:endParaRPr>
-          </a:p>
-        </p:txBody>
-      </p:sp>
-      <p:sp>
-        <p:nvSpPr>
-          <p:cNvPr id="59" name="PlaceHolder 3"/>
-          <p:cNvSpPr>
-            <a:spLocks noGrp="1"/>
-          </p:cNvSpPr>
-          <p:nvPr>
-            <p:ph/>
-          </p:nvPr>
-        </p:nvSpPr>
-        <p:spPr>
-          <a:xfrm>
-            <a:off x="2514960" y="1604520"/>
-            <a:ext cx="1959480" cy="1896480"/>
-          </a:xfrm>
-          <a:prstGeom prst="rect">
-            <a:avLst/>
-          </a:prstGeom>
-          <a:noFill/>
-          <a:ln w="0">
-            <a:noFill/>
-          </a:ln>
-        </p:spPr>
-        <p:txBody>
-          <a:bodyPr lIns="0" rIns="0" tIns="0" bIns="0" anchor="t">
-            <a:normAutofit/>
-          </a:bodyPr>
-          <a:p>
-            <a:pPr indent="0">
-              <a:spcBef>
-                <a:spcPts val="1417"/>
-              </a:spcBef>
-              <a:buNone/>
-            </a:pPr>
-            <a:endParaRPr b="0" lang="en-US" sz="3200" spc="-1" strike="noStrike">
-              <a:solidFill>
-                <a:srgbClr val="000000"/>
-              </a:solidFill>
-              <a:latin typeface="Arial"/>
-            </a:endParaRPr>
-          </a:p>
-        </p:txBody>
-      </p:sp>
-      <p:sp>
-        <p:nvSpPr>
-          <p:cNvPr id="60" name="PlaceHolder 4"/>
-          <p:cNvSpPr>
-            <a:spLocks noGrp="1"/>
-          </p:cNvSpPr>
-          <p:nvPr>
-            <p:ph/>
-          </p:nvPr>
-        </p:nvSpPr>
-        <p:spPr>
-          <a:xfrm>
-            <a:off x="457200" y="2595240"/>
-            <a:ext cx="1959480" cy="904320"/>
-          </a:xfrm>
-          <a:prstGeom prst="rect">
-            <a:avLst/>
-          </a:prstGeom>
-          <a:noFill/>
-          <a:ln w="0">
-            <a:noFill/>
-          </a:ln>
-        </p:spPr>
-        <p:txBody>
-          <a:bodyPr lIns="0" rIns="0" tIns="0" bIns="0" anchor="t">
-            <a:normAutofit fontScale="96865"/>
-          </a:bodyPr>
-          <a:p>
-            <a:pPr indent="0">
-              <a:spcBef>
-                <a:spcPts val="1417"/>
-              </a:spcBef>
-              <a:buNone/>
-            </a:pPr>
-            <a:endParaRPr b="0" lang="en-US" sz="3200" spc="-1" strike="noStrike">
-              <a:solidFill>
-                <a:srgbClr val="000000"/>
-              </a:solidFill>
-              <a:latin typeface="Arial"/>
-            </a:endParaRPr>
-          </a:p>
-        </p:txBody>
-      </p:sp>
-      <p:sp>
-        <p:nvSpPr>
-          <p:cNvPr id="6" name="PlaceHolder 5"/>
-          <p:cNvSpPr>
-            <a:spLocks noGrp="1"/>
-          </p:cNvSpPr>
-          <p:nvPr>
-            <p:ph type="ftr" idx="4"/>
-          </p:nvPr>
-        </p:nvSpPr>
-        <p:spPr/>
-        <p:txBody>
-          <a:bodyPr/>
-          <a:p>
-            <a:r>
-              <a:t>Footer</a:t>
-            </a:r>
-          </a:p>
-        </p:txBody>
-      </p:sp>
-      <p:sp>
-        <p:nvSpPr>
-          <p:cNvPr id="7" name="PlaceHolder 6"/>
-          <p:cNvSpPr>
-            <a:spLocks noGrp="1"/>
-          </p:cNvSpPr>
-          <p:nvPr>
-            <p:ph type="sldNum" idx="5"/>
-          </p:nvPr>
-        </p:nvSpPr>
-        <p:spPr/>
-        <p:txBody>
-          <a:bodyPr/>
-          <a:p>
-            <a:fld id="{05C02B46-F005-4383-B4BA-418F9778E835}" type="slidenum">
-              <a:t>&lt;#&gt;</a:t>
-            </a:fld>
-          </a:p>
-        </p:txBody>
-      </p:sp>
-      <p:sp>
-        <p:nvSpPr>
-          <p:cNvPr id="8" name="PlaceHolder 7"/>
-          <p:cNvSpPr>
-            <a:spLocks noGrp="1"/>
-          </p:cNvSpPr>
-          <p:nvPr>
-            <p:ph type="dt" idx="6"/>
           </p:nvPr>
         </p:nvSpPr>
         <p:spPr/>
@@ -3294,7 +2176,7 @@
         <p:spPr>
           <a:xfrm>
             <a:off x="457200" y="274680"/>
-            <a:ext cx="8228520" cy="1141920"/>
+            <a:ext cx="8227800" cy="1141200"/>
           </a:xfrm>
           <a:prstGeom prst="rect">
             <a:avLst/>
@@ -3333,8 +2215,8 @@
         </p:nvSpPr>
         <p:spPr>
           <a:xfrm>
-            <a:off x="457200" y="1604520"/>
-            <a:ext cx="4015440" cy="1896480"/>
+            <a:off x="457200" y="908280"/>
+            <a:ext cx="955440" cy="1823400"/>
           </a:xfrm>
           <a:prstGeom prst="rect">
             <a:avLst/>
@@ -3395,7 +2277,7 @@
         <p:txBody>
           <a:bodyPr/>
           <a:p>
-            <a:fld id="{999327E4-EB91-44A2-B8AB-47753554C3B7}" type="slidenum">
+            <a:fld id="{C69D4AFE-7D9C-4A33-A662-05FB066F8210}" type="slidenum">
               <a:t>&lt;#&gt;</a:t>
             </a:fld>
           </a:p>
@@ -3409,1395 +2291,6 @@
           </p:cNvSpPr>
           <p:nvPr>
             <p:ph type="dt" idx="3"/>
-          </p:nvPr>
-        </p:nvSpPr>
-        <p:spPr/>
-        <p:txBody>
-          <a:bodyPr/>
-          <a:p>
-            <a:r>
-              <a:rPr lang="en-US"/>
-              <a:t/>
-            </a:r>
-          </a:p>
-        </p:txBody>
-      </p:sp>
-    </p:spTree>
-  </p:cSld>
-</p:sldLayout>
-</file>
-
-<file path=ppt/slideLayouts/slideLayout20.xml><?xml version="1.0" encoding="utf-8"?>
-<p:sldLayout xmlns:a="http://schemas.openxmlformats.org/drawingml/2006/main" xmlns:p="http://schemas.openxmlformats.org/presentationml/2006/main" xmlns:r="http://schemas.openxmlformats.org/officeDocument/2006/relationships" xmlns:p14="http://schemas.microsoft.com/office/powerpoint/2010/main" xmlns:p15="http://schemas.microsoft.com/office/powerpoint/2012/main" xmlns:mc="http://schemas.openxmlformats.org/markup-compatibility/2006" type="objAndTwoObj" preserve="1">
-  <p:cSld name="Title Content and 2 Content">
-    <p:spTree>
-      <p:nvGrpSpPr>
-        <p:cNvPr id="1" name=""/>
-        <p:cNvGrpSpPr/>
-        <p:nvPr/>
-      </p:nvGrpSpPr>
-      <p:grpSpPr>
-        <a:xfrm>
-          <a:off x="0" y="0"/>
-          <a:ext cx="0" cy="0"/>
-          <a:chOff x="0" y="0"/>
-          <a:chExt cx="0" cy="0"/>
-        </a:xfrm>
-      </p:grpSpPr>
-      <p:sp>
-        <p:nvSpPr>
-          <p:cNvPr id="61" name="PlaceHolder 1"/>
-          <p:cNvSpPr>
-            <a:spLocks noGrp="1"/>
-          </p:cNvSpPr>
-          <p:nvPr>
-            <p:ph type="title"/>
-          </p:nvPr>
-        </p:nvSpPr>
-        <p:spPr>
-          <a:xfrm>
-            <a:off x="457200" y="274680"/>
-            <a:ext cx="8228520" cy="1141920"/>
-          </a:xfrm>
-          <a:prstGeom prst="rect">
-            <a:avLst/>
-          </a:prstGeom>
-          <a:noFill/>
-          <a:ln w="0">
-            <a:noFill/>
-          </a:ln>
-        </p:spPr>
-        <p:txBody>
-          <a:bodyPr lIns="0" rIns="0" tIns="0" bIns="0" anchor="ctr">
-            <a:noAutofit/>
-          </a:bodyPr>
-          <a:p>
-            <a:pPr indent="0" algn="ctr">
-              <a:buNone/>
-            </a:pPr>
-            <a:endParaRPr b="0" lang="en-US" sz="4400" spc="-1" strike="noStrike">
-              <a:solidFill>
-                <a:srgbClr val="000000"/>
-              </a:solidFill>
-              <a:latin typeface="Arial"/>
-            </a:endParaRPr>
-          </a:p>
-        </p:txBody>
-      </p:sp>
-      <p:sp>
-        <p:nvSpPr>
-          <p:cNvPr id="62" name="PlaceHolder 2"/>
-          <p:cNvSpPr>
-            <a:spLocks noGrp="1"/>
-          </p:cNvSpPr>
-          <p:nvPr>
-            <p:ph/>
-          </p:nvPr>
-        </p:nvSpPr>
-        <p:spPr>
-          <a:xfrm>
-            <a:off x="457200" y="1604520"/>
-            <a:ext cx="1959480" cy="1896480"/>
-          </a:xfrm>
-          <a:prstGeom prst="rect">
-            <a:avLst/>
-          </a:prstGeom>
-          <a:noFill/>
-          <a:ln w="0">
-            <a:noFill/>
-          </a:ln>
-        </p:spPr>
-        <p:txBody>
-          <a:bodyPr lIns="0" rIns="0" tIns="0" bIns="0" anchor="t">
-            <a:normAutofit/>
-          </a:bodyPr>
-          <a:p>
-            <a:pPr indent="0">
-              <a:spcBef>
-                <a:spcPts val="1417"/>
-              </a:spcBef>
-              <a:buNone/>
-            </a:pPr>
-            <a:endParaRPr b="0" lang="en-US" sz="3200" spc="-1" strike="noStrike">
-              <a:solidFill>
-                <a:srgbClr val="000000"/>
-              </a:solidFill>
-              <a:latin typeface="Arial"/>
-            </a:endParaRPr>
-          </a:p>
-        </p:txBody>
-      </p:sp>
-      <p:sp>
-        <p:nvSpPr>
-          <p:cNvPr id="63" name="PlaceHolder 3"/>
-          <p:cNvSpPr>
-            <a:spLocks noGrp="1"/>
-          </p:cNvSpPr>
-          <p:nvPr>
-            <p:ph/>
-          </p:nvPr>
-        </p:nvSpPr>
-        <p:spPr>
-          <a:xfrm>
-            <a:off x="2514960" y="1604520"/>
-            <a:ext cx="1959480" cy="904320"/>
-          </a:xfrm>
-          <a:prstGeom prst="rect">
-            <a:avLst/>
-          </a:prstGeom>
-          <a:noFill/>
-          <a:ln w="0">
-            <a:noFill/>
-          </a:ln>
-        </p:spPr>
-        <p:txBody>
-          <a:bodyPr lIns="0" rIns="0" tIns="0" bIns="0" anchor="t">
-            <a:normAutofit fontScale="96865"/>
-          </a:bodyPr>
-          <a:p>
-            <a:pPr indent="0">
-              <a:spcBef>
-                <a:spcPts val="1417"/>
-              </a:spcBef>
-              <a:buNone/>
-            </a:pPr>
-            <a:endParaRPr b="0" lang="en-US" sz="3200" spc="-1" strike="noStrike">
-              <a:solidFill>
-                <a:srgbClr val="000000"/>
-              </a:solidFill>
-              <a:latin typeface="Arial"/>
-            </a:endParaRPr>
-          </a:p>
-        </p:txBody>
-      </p:sp>
-      <p:sp>
-        <p:nvSpPr>
-          <p:cNvPr id="64" name="PlaceHolder 4"/>
-          <p:cNvSpPr>
-            <a:spLocks noGrp="1"/>
-          </p:cNvSpPr>
-          <p:nvPr>
-            <p:ph/>
-          </p:nvPr>
-        </p:nvSpPr>
-        <p:spPr>
-          <a:xfrm>
-            <a:off x="2514960" y="2595240"/>
-            <a:ext cx="1959480" cy="904320"/>
-          </a:xfrm>
-          <a:prstGeom prst="rect">
-            <a:avLst/>
-          </a:prstGeom>
-          <a:noFill/>
-          <a:ln w="0">
-            <a:noFill/>
-          </a:ln>
-        </p:spPr>
-        <p:txBody>
-          <a:bodyPr lIns="0" rIns="0" tIns="0" bIns="0" anchor="t">
-            <a:normAutofit fontScale="96865"/>
-          </a:bodyPr>
-          <a:p>
-            <a:pPr indent="0">
-              <a:spcBef>
-                <a:spcPts val="1417"/>
-              </a:spcBef>
-              <a:buNone/>
-            </a:pPr>
-            <a:endParaRPr b="0" lang="en-US" sz="3200" spc="-1" strike="noStrike">
-              <a:solidFill>
-                <a:srgbClr val="000000"/>
-              </a:solidFill>
-              <a:latin typeface="Arial"/>
-            </a:endParaRPr>
-          </a:p>
-        </p:txBody>
-      </p:sp>
-      <p:sp>
-        <p:nvSpPr>
-          <p:cNvPr id="6" name="PlaceHolder 5"/>
-          <p:cNvSpPr>
-            <a:spLocks noGrp="1"/>
-          </p:cNvSpPr>
-          <p:nvPr>
-            <p:ph type="ftr" idx="4"/>
-          </p:nvPr>
-        </p:nvSpPr>
-        <p:spPr/>
-        <p:txBody>
-          <a:bodyPr/>
-          <a:p>
-            <a:r>
-              <a:t>Footer</a:t>
-            </a:r>
-          </a:p>
-        </p:txBody>
-      </p:sp>
-      <p:sp>
-        <p:nvSpPr>
-          <p:cNvPr id="7" name="PlaceHolder 6"/>
-          <p:cNvSpPr>
-            <a:spLocks noGrp="1"/>
-          </p:cNvSpPr>
-          <p:nvPr>
-            <p:ph type="sldNum" idx="5"/>
-          </p:nvPr>
-        </p:nvSpPr>
-        <p:spPr/>
-        <p:txBody>
-          <a:bodyPr/>
-          <a:p>
-            <a:fld id="{E1171928-2322-4AB3-9783-EF51A4D5F89B}" type="slidenum">
-              <a:t>&lt;#&gt;</a:t>
-            </a:fld>
-          </a:p>
-        </p:txBody>
-      </p:sp>
-      <p:sp>
-        <p:nvSpPr>
-          <p:cNvPr id="8" name="PlaceHolder 7"/>
-          <p:cNvSpPr>
-            <a:spLocks noGrp="1"/>
-          </p:cNvSpPr>
-          <p:nvPr>
-            <p:ph type="dt" idx="6"/>
-          </p:nvPr>
-        </p:nvSpPr>
-        <p:spPr/>
-        <p:txBody>
-          <a:bodyPr/>
-          <a:p>
-            <a:r>
-              <a:rPr lang="en-US"/>
-              <a:t/>
-            </a:r>
-          </a:p>
-        </p:txBody>
-      </p:sp>
-    </p:spTree>
-  </p:cSld>
-</p:sldLayout>
-</file>
-
-<file path=ppt/slideLayouts/slideLayout21.xml><?xml version="1.0" encoding="utf-8"?>
-<p:sldLayout xmlns:a="http://schemas.openxmlformats.org/drawingml/2006/main" xmlns:p="http://schemas.openxmlformats.org/presentationml/2006/main" xmlns:r="http://schemas.openxmlformats.org/officeDocument/2006/relationships" xmlns:p14="http://schemas.microsoft.com/office/powerpoint/2010/main" xmlns:p15="http://schemas.microsoft.com/office/powerpoint/2012/main" xmlns:mc="http://schemas.openxmlformats.org/markup-compatibility/2006" type="twoObjOverTx" preserve="1">
-  <p:cSld name="Title, 2 Content over Content">
-    <p:spTree>
-      <p:nvGrpSpPr>
-        <p:cNvPr id="1" name=""/>
-        <p:cNvGrpSpPr/>
-        <p:nvPr/>
-      </p:nvGrpSpPr>
-      <p:grpSpPr>
-        <a:xfrm>
-          <a:off x="0" y="0"/>
-          <a:ext cx="0" cy="0"/>
-          <a:chOff x="0" y="0"/>
-          <a:chExt cx="0" cy="0"/>
-        </a:xfrm>
-      </p:grpSpPr>
-      <p:sp>
-        <p:nvSpPr>
-          <p:cNvPr id="65" name="PlaceHolder 1"/>
-          <p:cNvSpPr>
-            <a:spLocks noGrp="1"/>
-          </p:cNvSpPr>
-          <p:nvPr>
-            <p:ph type="title"/>
-          </p:nvPr>
-        </p:nvSpPr>
-        <p:spPr>
-          <a:xfrm>
-            <a:off x="457200" y="274680"/>
-            <a:ext cx="8228520" cy="1141920"/>
-          </a:xfrm>
-          <a:prstGeom prst="rect">
-            <a:avLst/>
-          </a:prstGeom>
-          <a:noFill/>
-          <a:ln w="0">
-            <a:noFill/>
-          </a:ln>
-        </p:spPr>
-        <p:txBody>
-          <a:bodyPr lIns="0" rIns="0" tIns="0" bIns="0" anchor="ctr">
-            <a:noAutofit/>
-          </a:bodyPr>
-          <a:p>
-            <a:pPr indent="0" algn="ctr">
-              <a:buNone/>
-            </a:pPr>
-            <a:endParaRPr b="0" lang="en-US" sz="4400" spc="-1" strike="noStrike">
-              <a:solidFill>
-                <a:srgbClr val="000000"/>
-              </a:solidFill>
-              <a:latin typeface="Arial"/>
-            </a:endParaRPr>
-          </a:p>
-        </p:txBody>
-      </p:sp>
-      <p:sp>
-        <p:nvSpPr>
-          <p:cNvPr id="66" name="PlaceHolder 2"/>
-          <p:cNvSpPr>
-            <a:spLocks noGrp="1"/>
-          </p:cNvSpPr>
-          <p:nvPr>
-            <p:ph/>
-          </p:nvPr>
-        </p:nvSpPr>
-        <p:spPr>
-          <a:xfrm>
-            <a:off x="457200" y="1604520"/>
-            <a:ext cx="1959480" cy="904320"/>
-          </a:xfrm>
-          <a:prstGeom prst="rect">
-            <a:avLst/>
-          </a:prstGeom>
-          <a:noFill/>
-          <a:ln w="0">
-            <a:noFill/>
-          </a:ln>
-        </p:spPr>
-        <p:txBody>
-          <a:bodyPr lIns="0" rIns="0" tIns="0" bIns="0" anchor="t">
-            <a:normAutofit fontScale="96865"/>
-          </a:bodyPr>
-          <a:p>
-            <a:pPr indent="0">
-              <a:spcBef>
-                <a:spcPts val="1417"/>
-              </a:spcBef>
-              <a:buNone/>
-            </a:pPr>
-            <a:endParaRPr b="0" lang="en-US" sz="3200" spc="-1" strike="noStrike">
-              <a:solidFill>
-                <a:srgbClr val="000000"/>
-              </a:solidFill>
-              <a:latin typeface="Arial"/>
-            </a:endParaRPr>
-          </a:p>
-        </p:txBody>
-      </p:sp>
-      <p:sp>
-        <p:nvSpPr>
-          <p:cNvPr id="67" name="PlaceHolder 3"/>
-          <p:cNvSpPr>
-            <a:spLocks noGrp="1"/>
-          </p:cNvSpPr>
-          <p:nvPr>
-            <p:ph/>
-          </p:nvPr>
-        </p:nvSpPr>
-        <p:spPr>
-          <a:xfrm>
-            <a:off x="2514960" y="1604520"/>
-            <a:ext cx="1959480" cy="904320"/>
-          </a:xfrm>
-          <a:prstGeom prst="rect">
-            <a:avLst/>
-          </a:prstGeom>
-          <a:noFill/>
-          <a:ln w="0">
-            <a:noFill/>
-          </a:ln>
-        </p:spPr>
-        <p:txBody>
-          <a:bodyPr lIns="0" rIns="0" tIns="0" bIns="0" anchor="t">
-            <a:normAutofit fontScale="96865"/>
-          </a:bodyPr>
-          <a:p>
-            <a:pPr indent="0">
-              <a:spcBef>
-                <a:spcPts val="1417"/>
-              </a:spcBef>
-              <a:buNone/>
-            </a:pPr>
-            <a:endParaRPr b="0" lang="en-US" sz="3200" spc="-1" strike="noStrike">
-              <a:solidFill>
-                <a:srgbClr val="000000"/>
-              </a:solidFill>
-              <a:latin typeface="Arial"/>
-            </a:endParaRPr>
-          </a:p>
-        </p:txBody>
-      </p:sp>
-      <p:sp>
-        <p:nvSpPr>
-          <p:cNvPr id="68" name="PlaceHolder 4"/>
-          <p:cNvSpPr>
-            <a:spLocks noGrp="1"/>
-          </p:cNvSpPr>
-          <p:nvPr>
-            <p:ph/>
-          </p:nvPr>
-        </p:nvSpPr>
-        <p:spPr>
-          <a:xfrm>
-            <a:off x="457200" y="2595240"/>
-            <a:ext cx="4015440" cy="904320"/>
-          </a:xfrm>
-          <a:prstGeom prst="rect">
-            <a:avLst/>
-          </a:prstGeom>
-          <a:noFill/>
-          <a:ln w="0">
-            <a:noFill/>
-          </a:ln>
-        </p:spPr>
-        <p:txBody>
-          <a:bodyPr lIns="0" rIns="0" tIns="0" bIns="0" anchor="t">
-            <a:normAutofit/>
-          </a:bodyPr>
-          <a:p>
-            <a:pPr indent="0">
-              <a:spcBef>
-                <a:spcPts val="1417"/>
-              </a:spcBef>
-              <a:buNone/>
-            </a:pPr>
-            <a:endParaRPr b="0" lang="en-US" sz="3200" spc="-1" strike="noStrike">
-              <a:solidFill>
-                <a:srgbClr val="000000"/>
-              </a:solidFill>
-              <a:latin typeface="Arial"/>
-            </a:endParaRPr>
-          </a:p>
-        </p:txBody>
-      </p:sp>
-      <p:sp>
-        <p:nvSpPr>
-          <p:cNvPr id="6" name="PlaceHolder 5"/>
-          <p:cNvSpPr>
-            <a:spLocks noGrp="1"/>
-          </p:cNvSpPr>
-          <p:nvPr>
-            <p:ph type="ftr" idx="4"/>
-          </p:nvPr>
-        </p:nvSpPr>
-        <p:spPr/>
-        <p:txBody>
-          <a:bodyPr/>
-          <a:p>
-            <a:r>
-              <a:t>Footer</a:t>
-            </a:r>
-          </a:p>
-        </p:txBody>
-      </p:sp>
-      <p:sp>
-        <p:nvSpPr>
-          <p:cNvPr id="7" name="PlaceHolder 6"/>
-          <p:cNvSpPr>
-            <a:spLocks noGrp="1"/>
-          </p:cNvSpPr>
-          <p:nvPr>
-            <p:ph type="sldNum" idx="5"/>
-          </p:nvPr>
-        </p:nvSpPr>
-        <p:spPr/>
-        <p:txBody>
-          <a:bodyPr/>
-          <a:p>
-            <a:fld id="{6A95930F-FA80-4777-A43F-682062FD0459}" type="slidenum">
-              <a:t>&lt;#&gt;</a:t>
-            </a:fld>
-          </a:p>
-        </p:txBody>
-      </p:sp>
-      <p:sp>
-        <p:nvSpPr>
-          <p:cNvPr id="8" name="PlaceHolder 7"/>
-          <p:cNvSpPr>
-            <a:spLocks noGrp="1"/>
-          </p:cNvSpPr>
-          <p:nvPr>
-            <p:ph type="dt" idx="6"/>
-          </p:nvPr>
-        </p:nvSpPr>
-        <p:spPr/>
-        <p:txBody>
-          <a:bodyPr/>
-          <a:p>
-            <a:r>
-              <a:rPr lang="en-US"/>
-              <a:t/>
-            </a:r>
-          </a:p>
-        </p:txBody>
-      </p:sp>
-    </p:spTree>
-  </p:cSld>
-</p:sldLayout>
-</file>
-
-<file path=ppt/slideLayouts/slideLayout22.xml><?xml version="1.0" encoding="utf-8"?>
-<p:sldLayout xmlns:a="http://schemas.openxmlformats.org/drawingml/2006/main" xmlns:p="http://schemas.openxmlformats.org/presentationml/2006/main" xmlns:r="http://schemas.openxmlformats.org/officeDocument/2006/relationships" xmlns:p14="http://schemas.microsoft.com/office/powerpoint/2010/main" xmlns:p15="http://schemas.microsoft.com/office/powerpoint/2012/main" xmlns:mc="http://schemas.openxmlformats.org/markup-compatibility/2006" type="objOverTx" preserve="1">
-  <p:cSld name="Title, Content over Content">
-    <p:spTree>
-      <p:nvGrpSpPr>
-        <p:cNvPr id="1" name=""/>
-        <p:cNvGrpSpPr/>
-        <p:nvPr/>
-      </p:nvGrpSpPr>
-      <p:grpSpPr>
-        <a:xfrm>
-          <a:off x="0" y="0"/>
-          <a:ext cx="0" cy="0"/>
-          <a:chOff x="0" y="0"/>
-          <a:chExt cx="0" cy="0"/>
-        </a:xfrm>
-      </p:grpSpPr>
-      <p:sp>
-        <p:nvSpPr>
-          <p:cNvPr id="69" name="PlaceHolder 1"/>
-          <p:cNvSpPr>
-            <a:spLocks noGrp="1"/>
-          </p:cNvSpPr>
-          <p:nvPr>
-            <p:ph type="title"/>
-          </p:nvPr>
-        </p:nvSpPr>
-        <p:spPr>
-          <a:xfrm>
-            <a:off x="457200" y="274680"/>
-            <a:ext cx="8228520" cy="1141920"/>
-          </a:xfrm>
-          <a:prstGeom prst="rect">
-            <a:avLst/>
-          </a:prstGeom>
-          <a:noFill/>
-          <a:ln w="0">
-            <a:noFill/>
-          </a:ln>
-        </p:spPr>
-        <p:txBody>
-          <a:bodyPr lIns="0" rIns="0" tIns="0" bIns="0" anchor="ctr">
-            <a:noAutofit/>
-          </a:bodyPr>
-          <a:p>
-            <a:pPr indent="0" algn="ctr">
-              <a:buNone/>
-            </a:pPr>
-            <a:endParaRPr b="0" lang="en-US" sz="4400" spc="-1" strike="noStrike">
-              <a:solidFill>
-                <a:srgbClr val="000000"/>
-              </a:solidFill>
-              <a:latin typeface="Arial"/>
-            </a:endParaRPr>
-          </a:p>
-        </p:txBody>
-      </p:sp>
-      <p:sp>
-        <p:nvSpPr>
-          <p:cNvPr id="70" name="PlaceHolder 2"/>
-          <p:cNvSpPr>
-            <a:spLocks noGrp="1"/>
-          </p:cNvSpPr>
-          <p:nvPr>
-            <p:ph/>
-          </p:nvPr>
-        </p:nvSpPr>
-        <p:spPr>
-          <a:xfrm>
-            <a:off x="457200" y="1604520"/>
-            <a:ext cx="4015440" cy="904320"/>
-          </a:xfrm>
-          <a:prstGeom prst="rect">
-            <a:avLst/>
-          </a:prstGeom>
-          <a:noFill/>
-          <a:ln w="0">
-            <a:noFill/>
-          </a:ln>
-        </p:spPr>
-        <p:txBody>
-          <a:bodyPr lIns="0" rIns="0" tIns="0" bIns="0" anchor="t">
-            <a:normAutofit/>
-          </a:bodyPr>
-          <a:p>
-            <a:pPr indent="0">
-              <a:spcBef>
-                <a:spcPts val="1417"/>
-              </a:spcBef>
-              <a:buNone/>
-            </a:pPr>
-            <a:endParaRPr b="0" lang="en-US" sz="3200" spc="-1" strike="noStrike">
-              <a:solidFill>
-                <a:srgbClr val="000000"/>
-              </a:solidFill>
-              <a:latin typeface="Arial"/>
-            </a:endParaRPr>
-          </a:p>
-        </p:txBody>
-      </p:sp>
-      <p:sp>
-        <p:nvSpPr>
-          <p:cNvPr id="71" name="PlaceHolder 3"/>
-          <p:cNvSpPr>
-            <a:spLocks noGrp="1"/>
-          </p:cNvSpPr>
-          <p:nvPr>
-            <p:ph/>
-          </p:nvPr>
-        </p:nvSpPr>
-        <p:spPr>
-          <a:xfrm>
-            <a:off x="457200" y="2595240"/>
-            <a:ext cx="4015440" cy="904320"/>
-          </a:xfrm>
-          <a:prstGeom prst="rect">
-            <a:avLst/>
-          </a:prstGeom>
-          <a:noFill/>
-          <a:ln w="0">
-            <a:noFill/>
-          </a:ln>
-        </p:spPr>
-        <p:txBody>
-          <a:bodyPr lIns="0" rIns="0" tIns="0" bIns="0" anchor="t">
-            <a:normAutofit/>
-          </a:bodyPr>
-          <a:p>
-            <a:pPr indent="0">
-              <a:spcBef>
-                <a:spcPts val="1417"/>
-              </a:spcBef>
-              <a:buNone/>
-            </a:pPr>
-            <a:endParaRPr b="0" lang="en-US" sz="3200" spc="-1" strike="noStrike">
-              <a:solidFill>
-                <a:srgbClr val="000000"/>
-              </a:solidFill>
-              <a:latin typeface="Arial"/>
-            </a:endParaRPr>
-          </a:p>
-        </p:txBody>
-      </p:sp>
-      <p:sp>
-        <p:nvSpPr>
-          <p:cNvPr id="5" name="PlaceHolder 4"/>
-          <p:cNvSpPr>
-            <a:spLocks noGrp="1"/>
-          </p:cNvSpPr>
-          <p:nvPr>
-            <p:ph type="ftr" idx="4"/>
-          </p:nvPr>
-        </p:nvSpPr>
-        <p:spPr/>
-        <p:txBody>
-          <a:bodyPr/>
-          <a:p>
-            <a:r>
-              <a:t>Footer</a:t>
-            </a:r>
-          </a:p>
-        </p:txBody>
-      </p:sp>
-      <p:sp>
-        <p:nvSpPr>
-          <p:cNvPr id="6" name="PlaceHolder 5"/>
-          <p:cNvSpPr>
-            <a:spLocks noGrp="1"/>
-          </p:cNvSpPr>
-          <p:nvPr>
-            <p:ph type="sldNum" idx="5"/>
-          </p:nvPr>
-        </p:nvSpPr>
-        <p:spPr/>
-        <p:txBody>
-          <a:bodyPr/>
-          <a:p>
-            <a:fld id="{02F9495B-087E-448D-B90B-F892CF6E22F2}" type="slidenum">
-              <a:t>&lt;#&gt;</a:t>
-            </a:fld>
-          </a:p>
-        </p:txBody>
-      </p:sp>
-      <p:sp>
-        <p:nvSpPr>
-          <p:cNvPr id="7" name="PlaceHolder 6"/>
-          <p:cNvSpPr>
-            <a:spLocks noGrp="1"/>
-          </p:cNvSpPr>
-          <p:nvPr>
-            <p:ph type="dt" idx="6"/>
-          </p:nvPr>
-        </p:nvSpPr>
-        <p:spPr/>
-        <p:txBody>
-          <a:bodyPr/>
-          <a:p>
-            <a:r>
-              <a:rPr lang="en-US"/>
-              <a:t/>
-            </a:r>
-          </a:p>
-        </p:txBody>
-      </p:sp>
-    </p:spTree>
-  </p:cSld>
-</p:sldLayout>
-</file>
-
-<file path=ppt/slideLayouts/slideLayout23.xml><?xml version="1.0" encoding="utf-8"?>
-<p:sldLayout xmlns:a="http://schemas.openxmlformats.org/drawingml/2006/main" xmlns:p="http://schemas.openxmlformats.org/presentationml/2006/main" xmlns:r="http://schemas.openxmlformats.org/officeDocument/2006/relationships" xmlns:p14="http://schemas.microsoft.com/office/powerpoint/2010/main" xmlns:p15="http://schemas.microsoft.com/office/powerpoint/2012/main" xmlns:mc="http://schemas.openxmlformats.org/markup-compatibility/2006" type="fourObj" preserve="1">
-  <p:cSld name="Title, 4 Content">
-    <p:spTree>
-      <p:nvGrpSpPr>
-        <p:cNvPr id="1" name=""/>
-        <p:cNvGrpSpPr/>
-        <p:nvPr/>
-      </p:nvGrpSpPr>
-      <p:grpSpPr>
-        <a:xfrm>
-          <a:off x="0" y="0"/>
-          <a:ext cx="0" cy="0"/>
-          <a:chOff x="0" y="0"/>
-          <a:chExt cx="0" cy="0"/>
-        </a:xfrm>
-      </p:grpSpPr>
-      <p:sp>
-        <p:nvSpPr>
-          <p:cNvPr id="72" name="PlaceHolder 1"/>
-          <p:cNvSpPr>
-            <a:spLocks noGrp="1"/>
-          </p:cNvSpPr>
-          <p:nvPr>
-            <p:ph type="title"/>
-          </p:nvPr>
-        </p:nvSpPr>
-        <p:spPr>
-          <a:xfrm>
-            <a:off x="457200" y="274680"/>
-            <a:ext cx="8228520" cy="1141920"/>
-          </a:xfrm>
-          <a:prstGeom prst="rect">
-            <a:avLst/>
-          </a:prstGeom>
-          <a:noFill/>
-          <a:ln w="0">
-            <a:noFill/>
-          </a:ln>
-        </p:spPr>
-        <p:txBody>
-          <a:bodyPr lIns="0" rIns="0" tIns="0" bIns="0" anchor="ctr">
-            <a:noAutofit/>
-          </a:bodyPr>
-          <a:p>
-            <a:pPr indent="0" algn="ctr">
-              <a:buNone/>
-            </a:pPr>
-            <a:endParaRPr b="0" lang="en-US" sz="4400" spc="-1" strike="noStrike">
-              <a:solidFill>
-                <a:srgbClr val="000000"/>
-              </a:solidFill>
-              <a:latin typeface="Arial"/>
-            </a:endParaRPr>
-          </a:p>
-        </p:txBody>
-      </p:sp>
-      <p:sp>
-        <p:nvSpPr>
-          <p:cNvPr id="73" name="PlaceHolder 2"/>
-          <p:cNvSpPr>
-            <a:spLocks noGrp="1"/>
-          </p:cNvSpPr>
-          <p:nvPr>
-            <p:ph/>
-          </p:nvPr>
-        </p:nvSpPr>
-        <p:spPr>
-          <a:xfrm>
-            <a:off x="457200" y="1604520"/>
-            <a:ext cx="1959480" cy="904320"/>
-          </a:xfrm>
-          <a:prstGeom prst="rect">
-            <a:avLst/>
-          </a:prstGeom>
-          <a:noFill/>
-          <a:ln w="0">
-            <a:noFill/>
-          </a:ln>
-        </p:spPr>
-        <p:txBody>
-          <a:bodyPr lIns="0" rIns="0" tIns="0" bIns="0" anchor="t">
-            <a:normAutofit fontScale="96865"/>
-          </a:bodyPr>
-          <a:p>
-            <a:pPr indent="0">
-              <a:spcBef>
-                <a:spcPts val="1417"/>
-              </a:spcBef>
-              <a:buNone/>
-            </a:pPr>
-            <a:endParaRPr b="0" lang="en-US" sz="3200" spc="-1" strike="noStrike">
-              <a:solidFill>
-                <a:srgbClr val="000000"/>
-              </a:solidFill>
-              <a:latin typeface="Arial"/>
-            </a:endParaRPr>
-          </a:p>
-        </p:txBody>
-      </p:sp>
-      <p:sp>
-        <p:nvSpPr>
-          <p:cNvPr id="74" name="PlaceHolder 3"/>
-          <p:cNvSpPr>
-            <a:spLocks noGrp="1"/>
-          </p:cNvSpPr>
-          <p:nvPr>
-            <p:ph/>
-          </p:nvPr>
-        </p:nvSpPr>
-        <p:spPr>
-          <a:xfrm>
-            <a:off x="2514960" y="1604520"/>
-            <a:ext cx="1959480" cy="904320"/>
-          </a:xfrm>
-          <a:prstGeom prst="rect">
-            <a:avLst/>
-          </a:prstGeom>
-          <a:noFill/>
-          <a:ln w="0">
-            <a:noFill/>
-          </a:ln>
-        </p:spPr>
-        <p:txBody>
-          <a:bodyPr lIns="0" rIns="0" tIns="0" bIns="0" anchor="t">
-            <a:normAutofit fontScale="96865"/>
-          </a:bodyPr>
-          <a:p>
-            <a:pPr indent="0">
-              <a:spcBef>
-                <a:spcPts val="1417"/>
-              </a:spcBef>
-              <a:buNone/>
-            </a:pPr>
-            <a:endParaRPr b="0" lang="en-US" sz="3200" spc="-1" strike="noStrike">
-              <a:solidFill>
-                <a:srgbClr val="000000"/>
-              </a:solidFill>
-              <a:latin typeface="Arial"/>
-            </a:endParaRPr>
-          </a:p>
-        </p:txBody>
-      </p:sp>
-      <p:sp>
-        <p:nvSpPr>
-          <p:cNvPr id="75" name="PlaceHolder 4"/>
-          <p:cNvSpPr>
-            <a:spLocks noGrp="1"/>
-          </p:cNvSpPr>
-          <p:nvPr>
-            <p:ph/>
-          </p:nvPr>
-        </p:nvSpPr>
-        <p:spPr>
-          <a:xfrm>
-            <a:off x="457200" y="2595240"/>
-            <a:ext cx="1959480" cy="904320"/>
-          </a:xfrm>
-          <a:prstGeom prst="rect">
-            <a:avLst/>
-          </a:prstGeom>
-          <a:noFill/>
-          <a:ln w="0">
-            <a:noFill/>
-          </a:ln>
-        </p:spPr>
-        <p:txBody>
-          <a:bodyPr lIns="0" rIns="0" tIns="0" bIns="0" anchor="t">
-            <a:normAutofit fontScale="96865"/>
-          </a:bodyPr>
-          <a:p>
-            <a:pPr indent="0">
-              <a:spcBef>
-                <a:spcPts val="1417"/>
-              </a:spcBef>
-              <a:buNone/>
-            </a:pPr>
-            <a:endParaRPr b="0" lang="en-US" sz="3200" spc="-1" strike="noStrike">
-              <a:solidFill>
-                <a:srgbClr val="000000"/>
-              </a:solidFill>
-              <a:latin typeface="Arial"/>
-            </a:endParaRPr>
-          </a:p>
-        </p:txBody>
-      </p:sp>
-      <p:sp>
-        <p:nvSpPr>
-          <p:cNvPr id="76" name="PlaceHolder 5"/>
-          <p:cNvSpPr>
-            <a:spLocks noGrp="1"/>
-          </p:cNvSpPr>
-          <p:nvPr>
-            <p:ph/>
-          </p:nvPr>
-        </p:nvSpPr>
-        <p:spPr>
-          <a:xfrm>
-            <a:off x="2514960" y="2595240"/>
-            <a:ext cx="1959480" cy="904320"/>
-          </a:xfrm>
-          <a:prstGeom prst="rect">
-            <a:avLst/>
-          </a:prstGeom>
-          <a:noFill/>
-          <a:ln w="0">
-            <a:noFill/>
-          </a:ln>
-        </p:spPr>
-        <p:txBody>
-          <a:bodyPr lIns="0" rIns="0" tIns="0" bIns="0" anchor="t">
-            <a:normAutofit fontScale="96865"/>
-          </a:bodyPr>
-          <a:p>
-            <a:pPr indent="0">
-              <a:spcBef>
-                <a:spcPts val="1417"/>
-              </a:spcBef>
-              <a:buNone/>
-            </a:pPr>
-            <a:endParaRPr b="0" lang="en-US" sz="3200" spc="-1" strike="noStrike">
-              <a:solidFill>
-                <a:srgbClr val="000000"/>
-              </a:solidFill>
-              <a:latin typeface="Arial"/>
-            </a:endParaRPr>
-          </a:p>
-        </p:txBody>
-      </p:sp>
-      <p:sp>
-        <p:nvSpPr>
-          <p:cNvPr id="7" name="PlaceHolder 6"/>
-          <p:cNvSpPr>
-            <a:spLocks noGrp="1"/>
-          </p:cNvSpPr>
-          <p:nvPr>
-            <p:ph type="ftr" idx="4"/>
-          </p:nvPr>
-        </p:nvSpPr>
-        <p:spPr/>
-        <p:txBody>
-          <a:bodyPr/>
-          <a:p>
-            <a:r>
-              <a:t>Footer</a:t>
-            </a:r>
-          </a:p>
-        </p:txBody>
-      </p:sp>
-      <p:sp>
-        <p:nvSpPr>
-          <p:cNvPr id="8" name="PlaceHolder 7"/>
-          <p:cNvSpPr>
-            <a:spLocks noGrp="1"/>
-          </p:cNvSpPr>
-          <p:nvPr>
-            <p:ph type="sldNum" idx="5"/>
-          </p:nvPr>
-        </p:nvSpPr>
-        <p:spPr/>
-        <p:txBody>
-          <a:bodyPr/>
-          <a:p>
-            <a:fld id="{09EBCED4-68CA-4C56-8097-34A956585755}" type="slidenum">
-              <a:t>&lt;#&gt;</a:t>
-            </a:fld>
-          </a:p>
-        </p:txBody>
-      </p:sp>
-      <p:sp>
-        <p:nvSpPr>
-          <p:cNvPr id="9" name="PlaceHolder 8"/>
-          <p:cNvSpPr>
-            <a:spLocks noGrp="1"/>
-          </p:cNvSpPr>
-          <p:nvPr>
-            <p:ph type="dt" idx="6"/>
-          </p:nvPr>
-        </p:nvSpPr>
-        <p:spPr/>
-        <p:txBody>
-          <a:bodyPr/>
-          <a:p>
-            <a:r>
-              <a:rPr lang="en-US"/>
-              <a:t/>
-            </a:r>
-          </a:p>
-        </p:txBody>
-      </p:sp>
-    </p:spTree>
-  </p:cSld>
-</p:sldLayout>
-</file>
-
-<file path=ppt/slideLayouts/slideLayout24.xml><?xml version="1.0" encoding="utf-8"?>
-<p:sldLayout xmlns:a="http://schemas.openxmlformats.org/drawingml/2006/main" xmlns:p="http://schemas.openxmlformats.org/presentationml/2006/main" xmlns:r="http://schemas.openxmlformats.org/officeDocument/2006/relationships" xmlns:p14="http://schemas.microsoft.com/office/powerpoint/2010/main" xmlns:p15="http://schemas.microsoft.com/office/powerpoint/2012/main" xmlns:mc="http://schemas.openxmlformats.org/markup-compatibility/2006" type="blank" preserve="1">
-  <p:cSld name="Title, 6 Content">
-    <p:spTree>
-      <p:nvGrpSpPr>
-        <p:cNvPr id="1" name=""/>
-        <p:cNvGrpSpPr/>
-        <p:nvPr/>
-      </p:nvGrpSpPr>
-      <p:grpSpPr>
-        <a:xfrm>
-          <a:off x="0" y="0"/>
-          <a:ext cx="0" cy="0"/>
-          <a:chOff x="0" y="0"/>
-          <a:chExt cx="0" cy="0"/>
-        </a:xfrm>
-      </p:grpSpPr>
-      <p:sp>
-        <p:nvSpPr>
-          <p:cNvPr id="77" name="PlaceHolder 1"/>
-          <p:cNvSpPr>
-            <a:spLocks noGrp="1"/>
-          </p:cNvSpPr>
-          <p:nvPr>
-            <p:ph type="title"/>
-          </p:nvPr>
-        </p:nvSpPr>
-        <p:spPr>
-          <a:xfrm>
-            <a:off x="457200" y="274680"/>
-            <a:ext cx="8228520" cy="1141920"/>
-          </a:xfrm>
-          <a:prstGeom prst="rect">
-            <a:avLst/>
-          </a:prstGeom>
-          <a:noFill/>
-          <a:ln w="0">
-            <a:noFill/>
-          </a:ln>
-        </p:spPr>
-        <p:txBody>
-          <a:bodyPr lIns="0" rIns="0" tIns="0" bIns="0" anchor="ctr">
-            <a:noAutofit/>
-          </a:bodyPr>
-          <a:p>
-            <a:pPr indent="0" algn="ctr">
-              <a:buNone/>
-            </a:pPr>
-            <a:endParaRPr b="0" lang="en-US" sz="4400" spc="-1" strike="noStrike">
-              <a:solidFill>
-                <a:srgbClr val="000000"/>
-              </a:solidFill>
-              <a:latin typeface="Arial"/>
-            </a:endParaRPr>
-          </a:p>
-        </p:txBody>
-      </p:sp>
-      <p:sp>
-        <p:nvSpPr>
-          <p:cNvPr id="78" name="PlaceHolder 2"/>
-          <p:cNvSpPr>
-            <a:spLocks noGrp="1"/>
-          </p:cNvSpPr>
-          <p:nvPr>
-            <p:ph/>
-          </p:nvPr>
-        </p:nvSpPr>
-        <p:spPr>
-          <a:xfrm>
-            <a:off x="457200" y="1604520"/>
-            <a:ext cx="1292760" cy="904320"/>
-          </a:xfrm>
-          <a:prstGeom prst="rect">
-            <a:avLst/>
-          </a:prstGeom>
-          <a:noFill/>
-          <a:ln w="0">
-            <a:noFill/>
-          </a:ln>
-        </p:spPr>
-        <p:txBody>
-          <a:bodyPr lIns="0" rIns="0" tIns="0" bIns="0" anchor="t">
-            <a:normAutofit fontScale="74992" lnSpcReduction="10000"/>
-          </a:bodyPr>
-          <a:p>
-            <a:pPr indent="0">
-              <a:spcBef>
-                <a:spcPts val="1417"/>
-              </a:spcBef>
-              <a:buNone/>
-            </a:pPr>
-            <a:endParaRPr b="0" lang="en-US" sz="3200" spc="-1" strike="noStrike">
-              <a:solidFill>
-                <a:srgbClr val="000000"/>
-              </a:solidFill>
-              <a:latin typeface="Arial"/>
-            </a:endParaRPr>
-          </a:p>
-        </p:txBody>
-      </p:sp>
-      <p:sp>
-        <p:nvSpPr>
-          <p:cNvPr id="79" name="PlaceHolder 3"/>
-          <p:cNvSpPr>
-            <a:spLocks noGrp="1"/>
-          </p:cNvSpPr>
-          <p:nvPr>
-            <p:ph/>
-          </p:nvPr>
-        </p:nvSpPr>
-        <p:spPr>
-          <a:xfrm>
-            <a:off x="1815120" y="1604520"/>
-            <a:ext cx="1292760" cy="904320"/>
-          </a:xfrm>
-          <a:prstGeom prst="rect">
-            <a:avLst/>
-          </a:prstGeom>
-          <a:noFill/>
-          <a:ln w="0">
-            <a:noFill/>
-          </a:ln>
-        </p:spPr>
-        <p:txBody>
-          <a:bodyPr lIns="0" rIns="0" tIns="0" bIns="0" anchor="t">
-            <a:normAutofit fontScale="74992" lnSpcReduction="10000"/>
-          </a:bodyPr>
-          <a:p>
-            <a:pPr indent="0">
-              <a:spcBef>
-                <a:spcPts val="1417"/>
-              </a:spcBef>
-              <a:buNone/>
-            </a:pPr>
-            <a:endParaRPr b="0" lang="en-US" sz="3200" spc="-1" strike="noStrike">
-              <a:solidFill>
-                <a:srgbClr val="000000"/>
-              </a:solidFill>
-              <a:latin typeface="Arial"/>
-            </a:endParaRPr>
-          </a:p>
-        </p:txBody>
-      </p:sp>
-      <p:sp>
-        <p:nvSpPr>
-          <p:cNvPr id="80" name="PlaceHolder 4"/>
-          <p:cNvSpPr>
-            <a:spLocks noGrp="1"/>
-          </p:cNvSpPr>
-          <p:nvPr>
-            <p:ph/>
-          </p:nvPr>
-        </p:nvSpPr>
-        <p:spPr>
-          <a:xfrm>
-            <a:off x="3172680" y="1604520"/>
-            <a:ext cx="1292760" cy="904320"/>
-          </a:xfrm>
-          <a:prstGeom prst="rect">
-            <a:avLst/>
-          </a:prstGeom>
-          <a:noFill/>
-          <a:ln w="0">
-            <a:noFill/>
-          </a:ln>
-        </p:spPr>
-        <p:txBody>
-          <a:bodyPr lIns="0" rIns="0" tIns="0" bIns="0" anchor="t">
-            <a:normAutofit fontScale="74992" lnSpcReduction="10000"/>
-          </a:bodyPr>
-          <a:p>
-            <a:pPr indent="0">
-              <a:spcBef>
-                <a:spcPts val="1417"/>
-              </a:spcBef>
-              <a:buNone/>
-            </a:pPr>
-            <a:endParaRPr b="0" lang="en-US" sz="3200" spc="-1" strike="noStrike">
-              <a:solidFill>
-                <a:srgbClr val="000000"/>
-              </a:solidFill>
-              <a:latin typeface="Arial"/>
-            </a:endParaRPr>
-          </a:p>
-        </p:txBody>
-      </p:sp>
-      <p:sp>
-        <p:nvSpPr>
-          <p:cNvPr id="81" name="PlaceHolder 5"/>
-          <p:cNvSpPr>
-            <a:spLocks noGrp="1"/>
-          </p:cNvSpPr>
-          <p:nvPr>
-            <p:ph/>
-          </p:nvPr>
-        </p:nvSpPr>
-        <p:spPr>
-          <a:xfrm>
-            <a:off x="457200" y="2595240"/>
-            <a:ext cx="1292760" cy="904320"/>
-          </a:xfrm>
-          <a:prstGeom prst="rect">
-            <a:avLst/>
-          </a:prstGeom>
-          <a:noFill/>
-          <a:ln w="0">
-            <a:noFill/>
-          </a:ln>
-        </p:spPr>
-        <p:txBody>
-          <a:bodyPr lIns="0" rIns="0" tIns="0" bIns="0" anchor="t">
-            <a:normAutofit fontScale="74992" lnSpcReduction="10000"/>
-          </a:bodyPr>
-          <a:p>
-            <a:pPr indent="0">
-              <a:spcBef>
-                <a:spcPts val="1417"/>
-              </a:spcBef>
-              <a:buNone/>
-            </a:pPr>
-            <a:endParaRPr b="0" lang="en-US" sz="3200" spc="-1" strike="noStrike">
-              <a:solidFill>
-                <a:srgbClr val="000000"/>
-              </a:solidFill>
-              <a:latin typeface="Arial"/>
-            </a:endParaRPr>
-          </a:p>
-        </p:txBody>
-      </p:sp>
-      <p:sp>
-        <p:nvSpPr>
-          <p:cNvPr id="82" name="PlaceHolder 6"/>
-          <p:cNvSpPr>
-            <a:spLocks noGrp="1"/>
-          </p:cNvSpPr>
-          <p:nvPr>
-            <p:ph/>
-          </p:nvPr>
-        </p:nvSpPr>
-        <p:spPr>
-          <a:xfrm>
-            <a:off x="1815120" y="2595240"/>
-            <a:ext cx="1292760" cy="904320"/>
-          </a:xfrm>
-          <a:prstGeom prst="rect">
-            <a:avLst/>
-          </a:prstGeom>
-          <a:noFill/>
-          <a:ln w="0">
-            <a:noFill/>
-          </a:ln>
-        </p:spPr>
-        <p:txBody>
-          <a:bodyPr lIns="0" rIns="0" tIns="0" bIns="0" anchor="t">
-            <a:normAutofit fontScale="74992" lnSpcReduction="10000"/>
-          </a:bodyPr>
-          <a:p>
-            <a:pPr indent="0">
-              <a:spcBef>
-                <a:spcPts val="1417"/>
-              </a:spcBef>
-              <a:buNone/>
-            </a:pPr>
-            <a:endParaRPr b="0" lang="en-US" sz="3200" spc="-1" strike="noStrike">
-              <a:solidFill>
-                <a:srgbClr val="000000"/>
-              </a:solidFill>
-              <a:latin typeface="Arial"/>
-            </a:endParaRPr>
-          </a:p>
-        </p:txBody>
-      </p:sp>
-      <p:sp>
-        <p:nvSpPr>
-          <p:cNvPr id="83" name="PlaceHolder 7"/>
-          <p:cNvSpPr>
-            <a:spLocks noGrp="1"/>
-          </p:cNvSpPr>
-          <p:nvPr>
-            <p:ph/>
-          </p:nvPr>
-        </p:nvSpPr>
-        <p:spPr>
-          <a:xfrm>
-            <a:off x="3172680" y="2595240"/>
-            <a:ext cx="1292760" cy="904320"/>
-          </a:xfrm>
-          <a:prstGeom prst="rect">
-            <a:avLst/>
-          </a:prstGeom>
-          <a:noFill/>
-          <a:ln w="0">
-            <a:noFill/>
-          </a:ln>
-        </p:spPr>
-        <p:txBody>
-          <a:bodyPr lIns="0" rIns="0" tIns="0" bIns="0" anchor="t">
-            <a:normAutofit fontScale="74992" lnSpcReduction="10000"/>
-          </a:bodyPr>
-          <a:p>
-            <a:pPr indent="0">
-              <a:spcBef>
-                <a:spcPts val="1417"/>
-              </a:spcBef>
-              <a:buNone/>
-            </a:pPr>
-            <a:endParaRPr b="0" lang="en-US" sz="3200" spc="-1" strike="noStrike">
-              <a:solidFill>
-                <a:srgbClr val="000000"/>
-              </a:solidFill>
-              <a:latin typeface="Arial"/>
-            </a:endParaRPr>
-          </a:p>
-        </p:txBody>
-      </p:sp>
-      <p:sp>
-        <p:nvSpPr>
-          <p:cNvPr id="9" name="PlaceHolder 8"/>
-          <p:cNvSpPr>
-            <a:spLocks noGrp="1"/>
-          </p:cNvSpPr>
-          <p:nvPr>
-            <p:ph type="ftr" idx="4"/>
-          </p:nvPr>
-        </p:nvSpPr>
-        <p:spPr/>
-        <p:txBody>
-          <a:bodyPr/>
-          <a:p>
-            <a:r>
-              <a:t>Footer</a:t>
-            </a:r>
-          </a:p>
-        </p:txBody>
-      </p:sp>
-      <p:sp>
-        <p:nvSpPr>
-          <p:cNvPr id="10" name="PlaceHolder 9"/>
-          <p:cNvSpPr>
-            <a:spLocks noGrp="1"/>
-          </p:cNvSpPr>
-          <p:nvPr>
-            <p:ph type="sldNum" idx="5"/>
-          </p:nvPr>
-        </p:nvSpPr>
-        <p:spPr/>
-        <p:txBody>
-          <a:bodyPr/>
-          <a:p>
-            <a:fld id="{48DDC734-7BD0-4808-B40B-5CD2F1646EEA}" type="slidenum">
-              <a:t>&lt;#&gt;</a:t>
-            </a:fld>
-          </a:p>
-        </p:txBody>
-      </p:sp>
-      <p:sp>
-        <p:nvSpPr>
-          <p:cNvPr id="11" name="PlaceHolder 10"/>
-          <p:cNvSpPr>
-            <a:spLocks noGrp="1"/>
-          </p:cNvSpPr>
-          <p:nvPr>
-            <p:ph type="dt" idx="6"/>
           </p:nvPr>
         </p:nvSpPr>
         <p:spPr/>
@@ -4846,7 +2339,7 @@
         <p:spPr>
           <a:xfrm>
             <a:off x="457200" y="274680"/>
-            <a:ext cx="8228520" cy="1141920"/>
+            <a:ext cx="8227800" cy="1141200"/>
           </a:xfrm>
           <a:prstGeom prst="rect">
             <a:avLst/>
@@ -4886,7 +2379,7 @@
         <p:spPr>
           <a:xfrm>
             <a:off x="457200" y="1604520"/>
-            <a:ext cx="4015440" cy="1896480"/>
+            <a:ext cx="955440" cy="430560"/>
           </a:xfrm>
           <a:prstGeom prst="rect">
             <a:avLst/>
@@ -4898,7 +2391,7 @@
         </p:spPr>
         <p:txBody>
           <a:bodyPr lIns="0" rIns="0" tIns="0" bIns="0" anchor="t">
-            <a:normAutofit/>
+            <a:normAutofit fontScale="34371" lnSpcReduction="10000"/>
           </a:bodyPr>
           <a:p>
             <a:pPr indent="0">
@@ -4950,7 +2443,7 @@
         <p:txBody>
           <a:bodyPr/>
           <a:p>
-            <a:fld id="{A451DF79-E66C-4F8E-A5C6-46DD1C10E158}" type="slidenum">
+            <a:fld id="{73A00778-D0E8-4FA7-82F8-2A6847289DAF}" type="slidenum">
               <a:t>&lt;#&gt;</a:t>
             </a:fld>
           </a:p>
@@ -5012,7 +2505,7 @@
         <p:spPr>
           <a:xfrm>
             <a:off x="457200" y="274680"/>
-            <a:ext cx="8228520" cy="1141920"/>
+            <a:ext cx="8227800" cy="1141200"/>
           </a:xfrm>
           <a:prstGeom prst="rect">
             <a:avLst/>
@@ -5052,7 +2545,7 @@
         <p:spPr>
           <a:xfrm>
             <a:off x="457200" y="1604520"/>
-            <a:ext cx="1959480" cy="1896480"/>
+            <a:ext cx="466200" cy="430560"/>
           </a:xfrm>
           <a:prstGeom prst="rect">
             <a:avLst/>
@@ -5064,7 +2557,7 @@
         </p:spPr>
         <p:txBody>
           <a:bodyPr lIns="0" rIns="0" tIns="0" bIns="0" anchor="t">
-            <a:normAutofit/>
+            <a:normAutofit fontScale="9374" lnSpcReduction="10000"/>
           </a:bodyPr>
           <a:p>
             <a:pPr indent="0">
@@ -5094,8 +2587,8 @@
         </p:nvSpPr>
         <p:spPr>
           <a:xfrm>
-            <a:off x="2514960" y="1604520"/>
-            <a:ext cx="1959480" cy="1896480"/>
+            <a:off x="947160" y="1604520"/>
+            <a:ext cx="466200" cy="430560"/>
           </a:xfrm>
           <a:prstGeom prst="rect">
             <a:avLst/>
@@ -5107,7 +2600,7 @@
         </p:spPr>
         <p:txBody>
           <a:bodyPr lIns="0" rIns="0" tIns="0" bIns="0" anchor="t">
-            <a:normAutofit/>
+            <a:normAutofit fontScale="9374" lnSpcReduction="10000"/>
           </a:bodyPr>
           <a:p>
             <a:pPr indent="0">
@@ -5159,7 +2652,7 @@
         <p:txBody>
           <a:bodyPr/>
           <a:p>
-            <a:fld id="{6FC8F044-84F1-42AB-B64D-86CB1ED5F921}" type="slidenum">
+            <a:fld id="{34DCE957-B864-4976-B44A-B41A2987DF2D}" type="slidenum">
               <a:t>&lt;#&gt;</a:t>
             </a:fld>
           </a:p>
@@ -5221,7 +2714,7 @@
         <p:spPr>
           <a:xfrm>
             <a:off x="457200" y="274680"/>
-            <a:ext cx="8228520" cy="1141920"/>
+            <a:ext cx="8227800" cy="1141200"/>
           </a:xfrm>
           <a:prstGeom prst="rect">
             <a:avLst/>
@@ -5282,7 +2775,7 @@
         <p:txBody>
           <a:bodyPr/>
           <a:p>
-            <a:fld id="{759B72AF-1E90-40E5-8B80-732A27C83C27}" type="slidenum">
+            <a:fld id="{36D04CE2-9FB6-42CB-9F31-68186C6065F5}" type="slidenum">
               <a:t>&lt;#&gt;</a:t>
             </a:fld>
           </a:p>
@@ -5344,7 +2837,7 @@
         <p:spPr>
           <a:xfrm>
             <a:off x="457200" y="274680"/>
-            <a:ext cx="8228520" cy="5294520"/>
+            <a:ext cx="8227800" cy="5291280"/>
           </a:xfrm>
           <a:prstGeom prst="rect">
             <a:avLst/>
@@ -5403,7 +2896,7 @@
         <p:txBody>
           <a:bodyPr/>
           <a:p>
-            <a:fld id="{422820D2-FB23-4458-89FF-7B76BFE56FAA}" type="slidenum">
+            <a:fld id="{2A561D37-CE1A-414E-B83B-5FAB89EEDB78}" type="slidenum">
               <a:t>&lt;#&gt;</a:t>
             </a:fld>
           </a:p>
@@ -5465,7 +2958,7 @@
         <p:spPr>
           <a:xfrm>
             <a:off x="457200" y="274680"/>
-            <a:ext cx="8228520" cy="1141920"/>
+            <a:ext cx="8227800" cy="1141200"/>
           </a:xfrm>
           <a:prstGeom prst="rect">
             <a:avLst/>
@@ -5505,7 +2998,7 @@
         <p:spPr>
           <a:xfrm>
             <a:off x="457200" y="1604520"/>
-            <a:ext cx="1959480" cy="904320"/>
+            <a:ext cx="466200" cy="205200"/>
           </a:xfrm>
           <a:prstGeom prst="rect">
             <a:avLst/>
@@ -5517,7 +3010,7 @@
         </p:spPr>
         <p:txBody>
           <a:bodyPr lIns="0" rIns="0" tIns="0" bIns="0" anchor="t">
-            <a:normAutofit fontScale="96865"/>
+            <a:normAutofit fontScale="6249"/>
           </a:bodyPr>
           <a:p>
             <a:pPr indent="0">
@@ -5547,8 +3040,8 @@
         </p:nvSpPr>
         <p:spPr>
           <a:xfrm>
-            <a:off x="2514960" y="1604520"/>
-            <a:ext cx="1959480" cy="1896480"/>
+            <a:off x="947160" y="1604520"/>
+            <a:ext cx="466200" cy="430560"/>
           </a:xfrm>
           <a:prstGeom prst="rect">
             <a:avLst/>
@@ -5560,7 +3053,7 @@
         </p:spPr>
         <p:txBody>
           <a:bodyPr lIns="0" rIns="0" tIns="0" bIns="0" anchor="t">
-            <a:normAutofit/>
+            <a:normAutofit fontScale="9374" lnSpcReduction="10000"/>
           </a:bodyPr>
           <a:p>
             <a:pPr indent="0">
@@ -5590,8 +3083,8 @@
         </p:nvSpPr>
         <p:spPr>
           <a:xfrm>
-            <a:off x="457200" y="2595240"/>
-            <a:ext cx="1959480" cy="904320"/>
+            <a:off x="457200" y="1829520"/>
+            <a:ext cx="466200" cy="205200"/>
           </a:xfrm>
           <a:prstGeom prst="rect">
             <a:avLst/>
@@ -5603,7 +3096,7 @@
         </p:spPr>
         <p:txBody>
           <a:bodyPr lIns="0" rIns="0" tIns="0" bIns="0" anchor="t">
-            <a:normAutofit fontScale="96865"/>
+            <a:normAutofit fontScale="6249"/>
           </a:bodyPr>
           <a:p>
             <a:pPr indent="0">
@@ -5655,7 +3148,7 @@
         <p:txBody>
           <a:bodyPr/>
           <a:p>
-            <a:fld id="{709CD41A-50BE-4E8B-AF4F-D6D1F86C224E}" type="slidenum">
+            <a:fld id="{92ADDC53-F382-43F8-BA78-929A3C7C7182}" type="slidenum">
               <a:t>&lt;#&gt;</a:t>
             </a:fld>
           </a:p>
@@ -5717,7 +3210,7 @@
         <p:spPr>
           <a:xfrm>
             <a:off x="457200" y="274680"/>
-            <a:ext cx="8228520" cy="1141920"/>
+            <a:ext cx="8227800" cy="1141200"/>
           </a:xfrm>
           <a:prstGeom prst="rect">
             <a:avLst/>
@@ -5757,7 +3250,7 @@
         <p:spPr>
           <a:xfrm>
             <a:off x="457200" y="1604520"/>
-            <a:ext cx="1959480" cy="1896480"/>
+            <a:ext cx="466200" cy="430560"/>
           </a:xfrm>
           <a:prstGeom prst="rect">
             <a:avLst/>
@@ -5769,7 +3262,7 @@
         </p:spPr>
         <p:txBody>
           <a:bodyPr lIns="0" rIns="0" tIns="0" bIns="0" anchor="t">
-            <a:normAutofit/>
+            <a:normAutofit fontScale="9374" lnSpcReduction="10000"/>
           </a:bodyPr>
           <a:p>
             <a:pPr indent="0">
@@ -5799,8 +3292,8 @@
         </p:nvSpPr>
         <p:spPr>
           <a:xfrm>
-            <a:off x="2514960" y="1604520"/>
-            <a:ext cx="1959480" cy="904320"/>
+            <a:off x="947160" y="1604520"/>
+            <a:ext cx="466200" cy="205200"/>
           </a:xfrm>
           <a:prstGeom prst="rect">
             <a:avLst/>
@@ -5812,7 +3305,7 @@
         </p:spPr>
         <p:txBody>
           <a:bodyPr lIns="0" rIns="0" tIns="0" bIns="0" anchor="t">
-            <a:normAutofit fontScale="96865"/>
+            <a:normAutofit fontScale="6249"/>
           </a:bodyPr>
           <a:p>
             <a:pPr indent="0">
@@ -5842,8 +3335,8 @@
         </p:nvSpPr>
         <p:spPr>
           <a:xfrm>
-            <a:off x="2514960" y="2595240"/>
-            <a:ext cx="1959480" cy="904320"/>
+            <a:off x="947160" y="1829520"/>
+            <a:ext cx="466200" cy="205200"/>
           </a:xfrm>
           <a:prstGeom prst="rect">
             <a:avLst/>
@@ -5855,7 +3348,7 @@
         </p:spPr>
         <p:txBody>
           <a:bodyPr lIns="0" rIns="0" tIns="0" bIns="0" anchor="t">
-            <a:normAutofit fontScale="96865"/>
+            <a:normAutofit fontScale="6249"/>
           </a:bodyPr>
           <a:p>
             <a:pPr indent="0">
@@ -5907,7 +3400,7 @@
         <p:txBody>
           <a:bodyPr/>
           <a:p>
-            <a:fld id="{207FF300-ECBD-4F17-AC6A-D0E8DAE1A6BB}" type="slidenum">
+            <a:fld id="{312FEB8F-899C-4060-BC6F-A765C820B295}" type="slidenum">
               <a:t>&lt;#&gt;</a:t>
             </a:fld>
           </a:p>
@@ -5969,7 +3462,7 @@
         <p:spPr>
           <a:xfrm>
             <a:off x="457200" y="274680"/>
-            <a:ext cx="8228520" cy="1141920"/>
+            <a:ext cx="8227800" cy="1141200"/>
           </a:xfrm>
           <a:prstGeom prst="rect">
             <a:avLst/>
@@ -6009,7 +3502,7 @@
         <p:spPr>
           <a:xfrm>
             <a:off x="457200" y="1604520"/>
-            <a:ext cx="1959480" cy="904320"/>
+            <a:ext cx="466200" cy="205200"/>
           </a:xfrm>
           <a:prstGeom prst="rect">
             <a:avLst/>
@@ -6021,7 +3514,7 @@
         </p:spPr>
         <p:txBody>
           <a:bodyPr lIns="0" rIns="0" tIns="0" bIns="0" anchor="t">
-            <a:normAutofit fontScale="96865"/>
+            <a:normAutofit fontScale="6249"/>
           </a:bodyPr>
           <a:p>
             <a:pPr indent="0">
@@ -6051,8 +3544,8 @@
         </p:nvSpPr>
         <p:spPr>
           <a:xfrm>
-            <a:off x="2514960" y="1604520"/>
-            <a:ext cx="1959480" cy="904320"/>
+            <a:off x="947160" y="1604520"/>
+            <a:ext cx="466200" cy="205200"/>
           </a:xfrm>
           <a:prstGeom prst="rect">
             <a:avLst/>
@@ -6064,7 +3557,7 @@
         </p:spPr>
         <p:txBody>
           <a:bodyPr lIns="0" rIns="0" tIns="0" bIns="0" anchor="t">
-            <a:normAutofit fontScale="96865"/>
+            <a:normAutofit fontScale="6249"/>
           </a:bodyPr>
           <a:p>
             <a:pPr indent="0">
@@ -6094,8 +3587,8 @@
         </p:nvSpPr>
         <p:spPr>
           <a:xfrm>
-            <a:off x="457200" y="2595240"/>
-            <a:ext cx="4015440" cy="904320"/>
+            <a:off x="457200" y="1829520"/>
+            <a:ext cx="955440" cy="205200"/>
           </a:xfrm>
           <a:prstGeom prst="rect">
             <a:avLst/>
@@ -6107,7 +3600,7 @@
         </p:spPr>
         <p:txBody>
           <a:bodyPr lIns="0" rIns="0" tIns="0" bIns="0" anchor="t">
-            <a:normAutofit/>
+            <a:normAutofit fontScale="24997" lnSpcReduction="10000"/>
           </a:bodyPr>
           <a:p>
             <a:pPr indent="0">
@@ -6159,7 +3652,7 @@
         <p:txBody>
           <a:bodyPr/>
           <a:p>
-            <a:fld id="{EAA54FCE-FEFA-4CB8-B552-BC33E0E9E9A8}" type="slidenum">
+            <a:fld id="{CAAD7A20-E451-400A-ADDC-D6BF88168820}" type="slidenum">
               <a:t>&lt;#&gt;</a:t>
             </a:fld>
           </a:p>
@@ -6228,7 +3721,7 @@
         <p:spPr>
           <a:xfrm>
             <a:off x="457200" y="274680"/>
-            <a:ext cx="8228520" cy="1141920"/>
+            <a:ext cx="8227800" cy="1141200"/>
           </a:xfrm>
           <a:prstGeom prst="rect">
             <a:avLst/>
@@ -6277,7 +3770,7 @@
         <p:spPr>
           <a:xfrm>
             <a:off x="457200" y="1604520"/>
-            <a:ext cx="4015440" cy="1896480"/>
+            <a:ext cx="955440" cy="430560"/>
           </a:xfrm>
           <a:prstGeom prst="rect">
             <a:avLst/>
@@ -6289,7 +3782,7 @@
         </p:spPr>
         <p:txBody>
           <a:bodyPr lIns="0" rIns="0" tIns="0" bIns="0" anchor="t">
-            <a:normAutofit fontScale="68333"/>
+            <a:normAutofit fontScale="1111"/>
           </a:bodyPr>
           <a:p>
             <a:pPr marL="432000" indent="-324000">
@@ -6501,8 +3994,8 @@
         </p:nvSpPr>
         <p:spPr>
           <a:xfrm>
-            <a:off x="4674240" y="1604520"/>
-            <a:ext cx="4015440" cy="1896480"/>
+            <a:off x="1461240" y="1604520"/>
+            <a:ext cx="955440" cy="430560"/>
           </a:xfrm>
           <a:prstGeom prst="rect">
             <a:avLst/>
@@ -6514,7 +4007,7 @@
         </p:spPr>
         <p:txBody>
           <a:bodyPr lIns="0" rIns="0" tIns="0" bIns="0" anchor="t">
-            <a:normAutofit fontScale="68333"/>
+            <a:normAutofit fontScale="1111"/>
           </a:bodyPr>
           <a:p>
             <a:pPr marL="432000" indent="-324000">
@@ -6726,8 +4219,8 @@
         </p:nvSpPr>
         <p:spPr>
           <a:xfrm>
-            <a:off x="457200" y="3682080"/>
-            <a:ext cx="8228880" cy="1896480"/>
+            <a:off x="457200" y="2076840"/>
+            <a:ext cx="1958760" cy="430560"/>
           </a:xfrm>
           <a:prstGeom prst="rect">
             <a:avLst/>
@@ -6739,7 +4232,7 @@
         </p:spPr>
         <p:txBody>
           <a:bodyPr lIns="0" rIns="0" tIns="0" bIns="0" anchor="t">
-            <a:normAutofit fontScale="71666"/>
+            <a:normAutofit fontScale="1111"/>
           </a:bodyPr>
           <a:p>
             <a:pPr marL="432000" indent="-324000">
@@ -6952,7 +4445,7 @@
         <p:spPr>
           <a:xfrm>
             <a:off x="3124080" y="6356520"/>
-            <a:ext cx="2894400" cy="363960"/>
+            <a:ext cx="2893680" cy="363240"/>
           </a:xfrm>
           <a:prstGeom prst="rect">
             <a:avLst/>
@@ -7024,7 +4517,7 @@
         <p:spPr>
           <a:xfrm>
             <a:off x="6553080" y="6356520"/>
-            <a:ext cx="2132640" cy="363960"/>
+            <a:ext cx="2131920" cy="363240"/>
           </a:xfrm>
           <a:prstGeom prst="rect">
             <a:avLst/>
@@ -7067,7 +4560,7 @@
                 <a:tab algn="l" pos="0"/>
               </a:tabLst>
             </a:pPr>
-            <a:fld id="{A20CFEED-ADBF-4023-96DB-AEFD95B9A677}" type="slidenum">
+            <a:fld id="{E76EE8FF-2BA7-405B-B136-712802833374}" type="slidenum">
               <a:rPr b="0" lang="en-US" sz="1200" spc="-1" strike="noStrike">
                 <a:solidFill>
                   <a:schemeClr val="dk1">
@@ -7100,7 +4593,7 @@
         <p:spPr>
           <a:xfrm>
             <a:off x="457200" y="6356520"/>
-            <a:ext cx="2132640" cy="363960"/>
+            <a:ext cx="2131920" cy="363240"/>
           </a:xfrm>
           <a:prstGeom prst="rect">
             <a:avLst/>
@@ -7163,532 +4656,6 @@
     <p:sldLayoutId id="2147483658" r:id="rId11"/>
     <p:sldLayoutId id="2147483659" r:id="rId12"/>
     <p:sldLayoutId id="2147483660" r:id="rId13"/>
-  </p:sldLayoutIdLst>
-</p:sldMaster>
-</file>
-
-<file path=ppt/slideMasters/slideMaster13.xml><?xml version="1.0" encoding="utf-8"?>
-<p:sldMaster xmlns:a="http://schemas.openxmlformats.org/drawingml/2006/main" xmlns:p="http://schemas.openxmlformats.org/presentationml/2006/main" xmlns:r="http://schemas.openxmlformats.org/officeDocument/2006/relationships" xmlns:p14="http://schemas.microsoft.com/office/powerpoint/2010/main" xmlns:p15="http://schemas.microsoft.com/office/powerpoint/2012/main" xmlns:mc="http://schemas.openxmlformats.org/markup-compatibility/2006">
-  <p:cSld>
-    <p:bg>
-      <p:bgPr>
-        <a:solidFill>
-          <a:srgbClr val="ffffff"/>
-        </a:solidFill>
-      </p:bgPr>
-    </p:bg>
-    <p:spTree>
-      <p:nvGrpSpPr>
-        <p:cNvPr id="1" name=""/>
-        <p:cNvGrpSpPr/>
-        <p:nvPr/>
-      </p:nvGrpSpPr>
-      <p:grpSpPr>
-        <a:xfrm>
-          <a:off x="0" y="0"/>
-          <a:ext cx="0" cy="0"/>
-          <a:chOff x="0" y="0"/>
-          <a:chExt cx="0" cy="0"/>
-        </a:xfrm>
-      </p:grpSpPr>
-      <p:sp>
-        <p:nvSpPr>
-          <p:cNvPr id="43" name="PlaceHolder 1"/>
-          <p:cNvSpPr>
-            <a:spLocks noGrp="1"/>
-          </p:cNvSpPr>
-          <p:nvPr>
-            <p:ph type="title"/>
-          </p:nvPr>
-        </p:nvSpPr>
-        <p:spPr>
-          <a:xfrm>
-            <a:off x="457200" y="274680"/>
-            <a:ext cx="8228880" cy="1142280"/>
-          </a:xfrm>
-          <a:prstGeom prst="rect">
-            <a:avLst/>
-          </a:prstGeom>
-          <a:noFill/>
-          <a:ln w="0">
-            <a:noFill/>
-          </a:ln>
-        </p:spPr>
-        <p:txBody>
-          <a:bodyPr lIns="0" rIns="0" tIns="0" bIns="0" anchor="ctr">
-            <a:noAutofit/>
-          </a:bodyPr>
-          <a:p>
-            <a:pPr indent="0">
-              <a:buNone/>
-            </a:pPr>
-            <a:r>
-              <a:rPr b="0" lang="en-US" sz="1800" spc="-1" strike="noStrike">
-                <a:solidFill>
-                  <a:srgbClr val="000000"/>
-                </a:solidFill>
-                <a:latin typeface="Arial"/>
-              </a:rPr>
-              <a:t>Click to edit the title text format</a:t>
-            </a:r>
-            <a:endParaRPr b="0" lang="en-US" sz="1800" spc="-1" strike="noStrike">
-              <a:solidFill>
-                <a:srgbClr val="000000"/>
-              </a:solidFill>
-              <a:latin typeface="Arial"/>
-            </a:endParaRPr>
-          </a:p>
-        </p:txBody>
-      </p:sp>
-      <p:sp>
-        <p:nvSpPr>
-          <p:cNvPr id="44" name="PlaceHolder 2"/>
-          <p:cNvSpPr>
-            <a:spLocks noGrp="1"/>
-          </p:cNvSpPr>
-          <p:nvPr>
-            <p:ph type="ftr" idx="4"/>
-          </p:nvPr>
-        </p:nvSpPr>
-        <p:spPr>
-          <a:xfrm>
-            <a:off x="3124080" y="6356520"/>
-            <a:ext cx="2894760" cy="364320"/>
-          </a:xfrm>
-          <a:prstGeom prst="rect">
-            <a:avLst/>
-          </a:prstGeom>
-          <a:noFill/>
-          <a:ln w="0">
-            <a:noFill/>
-          </a:ln>
-        </p:spPr>
-        <p:txBody>
-          <a:bodyPr lIns="91440" rIns="91440" tIns="45720" bIns="45720" anchor="ctr">
-            <a:noAutofit/>
-          </a:bodyPr>
-          <a:lstStyle>
-            <a:lvl1pPr indent="0" algn="ctr">
-              <a:lnSpc>
-                <a:spcPct val="100000"/>
-              </a:lnSpc>
-              <a:buNone/>
-              <a:tabLst>
-                <a:tab algn="l" pos="0"/>
-              </a:tabLst>
-              <a:defRPr b="0" lang="en-US" sz="1400" spc="-1" strike="noStrike">
-                <a:solidFill>
-                  <a:srgbClr val="000000"/>
-                </a:solidFill>
-                <a:latin typeface="Times New Roman"/>
-              </a:defRPr>
-            </a:lvl1pPr>
-          </a:lstStyle>
-          <a:p>
-            <a:pPr indent="0" algn="ctr">
-              <a:lnSpc>
-                <a:spcPct val="100000"/>
-              </a:lnSpc>
-              <a:buNone/>
-              <a:tabLst>
-                <a:tab algn="l" pos="0"/>
-              </a:tabLst>
-            </a:pPr>
-            <a:r>
-              <a:rPr b="0" lang="en-US" sz="1400" spc="-1" strike="noStrike">
-                <a:solidFill>
-                  <a:srgbClr val="000000"/>
-                </a:solidFill>
-                <a:latin typeface="Times New Roman"/>
-              </a:rPr>
-              <a:t>&lt;footer&gt;</a:t>
-            </a:r>
-            <a:endParaRPr b="0" lang="en-US" sz="1400" spc="-1" strike="noStrike">
-              <a:solidFill>
-                <a:srgbClr val="000000"/>
-              </a:solidFill>
-              <a:latin typeface="Times New Roman"/>
-            </a:endParaRPr>
-          </a:p>
-        </p:txBody>
-      </p:sp>
-      <p:sp>
-        <p:nvSpPr>
-          <p:cNvPr id="45" name="PlaceHolder 3"/>
-          <p:cNvSpPr>
-            <a:spLocks noGrp="1"/>
-          </p:cNvSpPr>
-          <p:nvPr>
-            <p:ph type="sldNum" idx="5"/>
-          </p:nvPr>
-        </p:nvSpPr>
-        <p:spPr>
-          <a:xfrm>
-            <a:off x="6553080" y="6356520"/>
-            <a:ext cx="2133000" cy="364320"/>
-          </a:xfrm>
-          <a:prstGeom prst="rect">
-            <a:avLst/>
-          </a:prstGeom>
-          <a:noFill/>
-          <a:ln w="0">
-            <a:noFill/>
-          </a:ln>
-        </p:spPr>
-        <p:txBody>
-          <a:bodyPr lIns="91440" rIns="91440" tIns="45720" bIns="45720" anchor="ctr">
-            <a:noAutofit/>
-          </a:bodyPr>
-          <a:lstStyle>
-            <a:lvl1pPr indent="0" algn="r" defTabSz="457200">
-              <a:lnSpc>
-                <a:spcPct val="100000"/>
-              </a:lnSpc>
-              <a:buNone/>
-              <a:tabLst>
-                <a:tab algn="l" pos="0"/>
-              </a:tabLst>
-              <a:defRPr b="0" lang="en-US" sz="1200" spc="-1" strike="noStrike">
-                <a:solidFill>
-                  <a:schemeClr val="dk1">
-                    <a:tint val="75000"/>
-                  </a:schemeClr>
-                </a:solidFill>
-                <a:latin typeface="Calibri"/>
-              </a:defRPr>
-            </a:lvl1pPr>
-          </a:lstStyle>
-          <a:p>
-            <a:pPr indent="0" algn="r" defTabSz="457200">
-              <a:lnSpc>
-                <a:spcPct val="100000"/>
-              </a:lnSpc>
-              <a:buNone/>
-              <a:tabLst>
-                <a:tab algn="l" pos="0"/>
-              </a:tabLst>
-            </a:pPr>
-            <a:fld id="{751ADD8C-419D-41F9-AE2E-05D00998B5A3}" type="slidenum">
-              <a:rPr b="0" lang="en-US" sz="1200" spc="-1" strike="noStrike">
-                <a:solidFill>
-                  <a:schemeClr val="dk1">
-                    <a:tint val="75000"/>
-                  </a:schemeClr>
-                </a:solidFill>
-                <a:latin typeface="Calibri"/>
-              </a:rPr>
-              <a:t>&lt;number&gt;</a:t>
-            </a:fld>
-            <a:endParaRPr b="0" lang="en-US" sz="1200" spc="-1" strike="noStrike">
-              <a:solidFill>
-                <a:srgbClr val="000000"/>
-              </a:solidFill>
-              <a:latin typeface="Times New Roman"/>
-            </a:endParaRPr>
-          </a:p>
-        </p:txBody>
-      </p:sp>
-      <p:sp>
-        <p:nvSpPr>
-          <p:cNvPr id="46" name="PlaceHolder 4"/>
-          <p:cNvSpPr>
-            <a:spLocks noGrp="1"/>
-          </p:cNvSpPr>
-          <p:nvPr>
-            <p:ph type="dt" idx="6"/>
-          </p:nvPr>
-        </p:nvSpPr>
-        <p:spPr>
-          <a:xfrm>
-            <a:off x="457200" y="6356520"/>
-            <a:ext cx="2133000" cy="364320"/>
-          </a:xfrm>
-          <a:prstGeom prst="rect">
-            <a:avLst/>
-          </a:prstGeom>
-          <a:noFill/>
-          <a:ln w="0">
-            <a:noFill/>
-          </a:ln>
-        </p:spPr>
-        <p:txBody>
-          <a:bodyPr lIns="91440" rIns="91440" tIns="45720" bIns="45720" anchor="ctr">
-            <a:noAutofit/>
-          </a:bodyPr>
-          <a:lstStyle>
-            <a:lvl1pPr indent="0">
-              <a:buNone/>
-              <a:defRPr b="0" lang="en-US" sz="1400" spc="-1" strike="noStrike">
-                <a:solidFill>
-                  <a:srgbClr val="000000"/>
-                </a:solidFill>
-                <a:latin typeface="Times New Roman"/>
-              </a:defRPr>
-            </a:lvl1pPr>
-          </a:lstStyle>
-          <a:p>
-            <a:pPr indent="0">
-              <a:buNone/>
-            </a:pPr>
-            <a:r>
-              <a:rPr b="0" lang="en-US" sz="1400" spc="-1" strike="noStrike">
-                <a:solidFill>
-                  <a:srgbClr val="000000"/>
-                </a:solidFill>
-                <a:latin typeface="Times New Roman"/>
-              </a:rPr>
-              <a:t>&lt;date/time&gt;</a:t>
-            </a:r>
-            <a:endParaRPr b="0" lang="en-US" sz="1400" spc="-1" strike="noStrike">
-              <a:solidFill>
-                <a:srgbClr val="000000"/>
-              </a:solidFill>
-              <a:latin typeface="Times New Roman"/>
-            </a:endParaRPr>
-          </a:p>
-        </p:txBody>
-      </p:sp>
-      <p:sp>
-        <p:nvSpPr>
-          <p:cNvPr id="47" name="PlaceHolder 5"/>
-          <p:cNvSpPr>
-            <a:spLocks noGrp="1"/>
-          </p:cNvSpPr>
-          <p:nvPr>
-            <p:ph type="body"/>
-          </p:nvPr>
-        </p:nvSpPr>
-        <p:spPr>
-          <a:xfrm>
-            <a:off x="457200" y="1604520"/>
-            <a:ext cx="8229240" cy="3977280"/>
-          </a:xfrm>
-          <a:prstGeom prst="rect">
-            <a:avLst/>
-          </a:prstGeom>
-          <a:noFill/>
-          <a:ln w="0">
-            <a:noFill/>
-          </a:ln>
-        </p:spPr>
-        <p:txBody>
-          <a:bodyPr lIns="0" rIns="0" tIns="0" bIns="0" anchor="t">
-            <a:normAutofit/>
-          </a:bodyPr>
-          <a:p>
-            <a:pPr marL="432000" indent="-324000">
-              <a:spcBef>
-                <a:spcPts val="1417"/>
-              </a:spcBef>
-              <a:buClr>
-                <a:srgbClr val="000000"/>
-              </a:buClr>
-              <a:buSzPct val="45000"/>
-              <a:buFont typeface="Wingdings" charset="2"/>
-              <a:buChar char=""/>
-            </a:pPr>
-            <a:r>
-              <a:rPr b="0" lang="en-US" sz="3200" spc="-1" strike="noStrike">
-                <a:solidFill>
-                  <a:srgbClr val="000000"/>
-                </a:solidFill>
-                <a:latin typeface="Arial"/>
-              </a:rPr>
-              <a:t>Click to edit the outline text format</a:t>
-            </a:r>
-            <a:endParaRPr b="0" lang="en-US" sz="3200" spc="-1" strike="noStrike">
-              <a:solidFill>
-                <a:srgbClr val="000000"/>
-              </a:solidFill>
-              <a:latin typeface="Arial"/>
-            </a:endParaRPr>
-          </a:p>
-          <a:p>
-            <a:pPr lvl="1" marL="864000" indent="-324000">
-              <a:spcBef>
-                <a:spcPts val="1134"/>
-              </a:spcBef>
-              <a:buClr>
-                <a:srgbClr val="000000"/>
-              </a:buClr>
-              <a:buSzPct val="75000"/>
-              <a:buFont typeface="Symbol" charset="2"/>
-              <a:buChar char=""/>
-            </a:pPr>
-            <a:r>
-              <a:rPr b="0" lang="en-US" sz="2800" spc="-1" strike="noStrike">
-                <a:solidFill>
-                  <a:srgbClr val="000000"/>
-                </a:solidFill>
-                <a:latin typeface="Arial"/>
-              </a:rPr>
-              <a:t>Second Outline Level</a:t>
-            </a:r>
-            <a:endParaRPr b="0" lang="en-US" sz="2800" spc="-1" strike="noStrike">
-              <a:solidFill>
-                <a:srgbClr val="000000"/>
-              </a:solidFill>
-              <a:latin typeface="Arial"/>
-            </a:endParaRPr>
-          </a:p>
-          <a:p>
-            <a:pPr lvl="2" marL="1296000" indent="-288000">
-              <a:spcBef>
-                <a:spcPts val="850"/>
-              </a:spcBef>
-              <a:buClr>
-                <a:srgbClr val="000000"/>
-              </a:buClr>
-              <a:buSzPct val="45000"/>
-              <a:buFont typeface="Wingdings" charset="2"/>
-              <a:buChar char=""/>
-            </a:pPr>
-            <a:r>
-              <a:rPr b="0" lang="en-US" sz="2400" spc="-1" strike="noStrike">
-                <a:solidFill>
-                  <a:srgbClr val="000000"/>
-                </a:solidFill>
-                <a:latin typeface="Arial"/>
-              </a:rPr>
-              <a:t>Third Outline Level</a:t>
-            </a:r>
-            <a:endParaRPr b="0" lang="en-US" sz="2400" spc="-1" strike="noStrike">
-              <a:solidFill>
-                <a:srgbClr val="000000"/>
-              </a:solidFill>
-              <a:latin typeface="Arial"/>
-            </a:endParaRPr>
-          </a:p>
-          <a:p>
-            <a:pPr lvl="3" marL="1728000" indent="-216000">
-              <a:spcBef>
-                <a:spcPts val="567"/>
-              </a:spcBef>
-              <a:buClr>
-                <a:srgbClr val="000000"/>
-              </a:buClr>
-              <a:buSzPct val="75000"/>
-              <a:buFont typeface="Symbol" charset="2"/>
-              <a:buChar char=""/>
-            </a:pPr>
-            <a:r>
-              <a:rPr b="0" lang="en-US" sz="2000" spc="-1" strike="noStrike">
-                <a:solidFill>
-                  <a:srgbClr val="000000"/>
-                </a:solidFill>
-                <a:latin typeface="Arial"/>
-              </a:rPr>
-              <a:t>Fourth Outline Level</a:t>
-            </a:r>
-            <a:endParaRPr b="0" lang="en-US" sz="2000" spc="-1" strike="noStrike">
-              <a:solidFill>
-                <a:srgbClr val="000000"/>
-              </a:solidFill>
-              <a:latin typeface="Arial"/>
-            </a:endParaRPr>
-          </a:p>
-          <a:p>
-            <a:pPr lvl="4" marL="2160000" indent="-216000">
-              <a:spcBef>
-                <a:spcPts val="283"/>
-              </a:spcBef>
-              <a:buClr>
-                <a:srgbClr val="000000"/>
-              </a:buClr>
-              <a:buSzPct val="45000"/>
-              <a:buFont typeface="Wingdings" charset="2"/>
-              <a:buChar char=""/>
-            </a:pPr>
-            <a:r>
-              <a:rPr b="0" lang="en-US" sz="2000" spc="-1" strike="noStrike">
-                <a:solidFill>
-                  <a:srgbClr val="000000"/>
-                </a:solidFill>
-                <a:latin typeface="Arial"/>
-              </a:rPr>
-              <a:t>Fifth Outline Level</a:t>
-            </a:r>
-            <a:endParaRPr b="0" lang="en-US" sz="2000" spc="-1" strike="noStrike">
-              <a:solidFill>
-                <a:srgbClr val="000000"/>
-              </a:solidFill>
-              <a:latin typeface="Arial"/>
-            </a:endParaRPr>
-          </a:p>
-          <a:p>
-            <a:pPr lvl="5" marL="2592000" indent="-216000">
-              <a:spcBef>
-                <a:spcPts val="283"/>
-              </a:spcBef>
-              <a:buClr>
-                <a:srgbClr val="000000"/>
-              </a:buClr>
-              <a:buSzPct val="45000"/>
-              <a:buFont typeface="Wingdings" charset="2"/>
-              <a:buChar char=""/>
-            </a:pPr>
-            <a:r>
-              <a:rPr b="0" lang="en-US" sz="2000" spc="-1" strike="noStrike">
-                <a:solidFill>
-                  <a:srgbClr val="000000"/>
-                </a:solidFill>
-                <a:latin typeface="Arial"/>
-              </a:rPr>
-              <a:t>Sixth Outline Level</a:t>
-            </a:r>
-            <a:endParaRPr b="0" lang="en-US" sz="2000" spc="-1" strike="noStrike">
-              <a:solidFill>
-                <a:srgbClr val="000000"/>
-              </a:solidFill>
-              <a:latin typeface="Arial"/>
-            </a:endParaRPr>
-          </a:p>
-          <a:p>
-            <a:pPr lvl="6" marL="3024000" indent="-216000">
-              <a:spcBef>
-                <a:spcPts val="283"/>
-              </a:spcBef>
-              <a:buClr>
-                <a:srgbClr val="000000"/>
-              </a:buClr>
-              <a:buSzPct val="45000"/>
-              <a:buFont typeface="Wingdings" charset="2"/>
-              <a:buChar char=""/>
-            </a:pPr>
-            <a:r>
-              <a:rPr b="0" lang="en-US" sz="2000" spc="-1" strike="noStrike">
-                <a:solidFill>
-                  <a:srgbClr val="000000"/>
-                </a:solidFill>
-                <a:latin typeface="Arial"/>
-              </a:rPr>
-              <a:t>Seventh Outline Level</a:t>
-            </a:r>
-            <a:endParaRPr b="0" lang="en-US" sz="2000" spc="-1" strike="noStrike">
-              <a:solidFill>
-                <a:srgbClr val="000000"/>
-              </a:solidFill>
-              <a:latin typeface="Arial"/>
-            </a:endParaRPr>
-          </a:p>
-        </p:txBody>
-      </p:sp>
-    </p:spTree>
-  </p:cSld>
-  <p:clrMap bg1="lt1" bg2="lt2" tx1="dk1" tx2="dk2" accent1="accent1" accent2="accent2" accent3="accent3" accent4="accent4" accent5="accent5" accent6="accent6" hlink="hlink" folHlink="folHlink"/>
-  <p:sldLayoutIdLst>
-    <p:sldLayoutId id="2147483662" r:id="rId2"/>
-    <p:sldLayoutId id="2147483663" r:id="rId3"/>
-    <p:sldLayoutId id="2147483664" r:id="rId4"/>
-    <p:sldLayoutId id="2147483665" r:id="rId5"/>
-    <p:sldLayoutId id="2147483666" r:id="rId6"/>
-    <p:sldLayoutId id="2147483667" r:id="rId7"/>
-    <p:sldLayoutId id="2147483668" r:id="rId8"/>
-    <p:sldLayoutId id="2147483669" r:id="rId9"/>
-    <p:sldLayoutId id="2147483670" r:id="rId10"/>
-    <p:sldLayoutId id="2147483671" r:id="rId11"/>
-    <p:sldLayoutId id="2147483672" r:id="rId12"/>
-    <p:sldLayoutId id="2147483673" r:id="rId13"/>
   </p:sldLayoutIdLst>
 </p:sldMaster>
 </file>
@@ -7712,7 +4679,7 @@
       </p:grpSpPr>
       <p:sp>
         <p:nvSpPr>
-          <p:cNvPr id="90" name="PlaceHolder 1"/>
+          <p:cNvPr id="49" name="PlaceHolder 1"/>
           <p:cNvSpPr>
             <a:spLocks noGrp="1"/>
           </p:cNvSpPr>
@@ -7723,7 +4690,7 @@
         <p:spPr>
           <a:xfrm>
             <a:off x="685800" y="2130480"/>
-            <a:ext cx="7771320" cy="1468800"/>
+            <a:ext cx="7770600" cy="1468080"/>
           </a:xfrm>
           <a:prstGeom prst="rect">
             <a:avLst/>
@@ -7754,7 +4721,7 @@
                 </a:solidFill>
                 <a:latin typeface="Calibri"/>
               </a:rPr>
-              <a:t>Part 1: Intro &amp; IaC Landscape</a:t>
+              <a:t>Part 1: Intro &amp; Terraform IaC Landscape</a:t>
             </a:r>
             <a:endParaRPr b="0" lang="en-US" sz="4400" spc="-1" strike="noStrike">
               <a:solidFill>
@@ -7767,7 +4734,7 @@
       </p:sp>
       <p:sp>
         <p:nvSpPr>
-          <p:cNvPr id="91" name="PlaceHolder 2"/>
+          <p:cNvPr id="50" name="PlaceHolder 2"/>
           <p:cNvSpPr>
             <a:spLocks noGrp="1"/>
           </p:cNvSpPr>
@@ -7778,7 +4745,7 @@
         <p:spPr>
           <a:xfrm>
             <a:off x="1371600" y="3886200"/>
-            <a:ext cx="6399720" cy="1751400"/>
+            <a:ext cx="6399000" cy="1750680"/>
           </a:xfrm>
           <a:prstGeom prst="rect">
             <a:avLst/>
@@ -7813,8 +4780,9 @@
                   </a:schemeClr>
                 </a:solidFill>
                 <a:latin typeface="Calibri"/>
-              </a:rPr>
-              <a:t>Terraform vs Pulumi vs Terragrunt | GitOps and Atlantis Concept</a:t>
+                <a:ea typeface="PingFang SC"/>
+              </a:rPr>
+              <a:t>Terraform | GitOps and Atlantis Concept | Pulumi</a:t>
             </a:r>
             <a:endParaRPr b="0" lang="en-US" sz="3200" spc="-1" strike="noStrike">
               <a:solidFill>
@@ -7857,7 +4825,7 @@
       </p:grpSpPr>
       <p:sp>
         <p:nvSpPr>
-          <p:cNvPr id="92" name="PlaceHolder 1"/>
+          <p:cNvPr id="51" name="PlaceHolder 1"/>
           <p:cNvSpPr>
             <a:spLocks noGrp="1"/>
           </p:cNvSpPr>
@@ -7868,7 +4836,7 @@
         <p:spPr>
           <a:xfrm>
             <a:off x="457200" y="274680"/>
-            <a:ext cx="8228880" cy="1142280"/>
+            <a:ext cx="8228160" cy="1141560"/>
           </a:xfrm>
           <a:prstGeom prst="rect">
             <a:avLst/>
@@ -7912,7 +4880,7 @@
       </p:sp>
       <p:sp>
         <p:nvSpPr>
-          <p:cNvPr id="93" name="PlaceHolder 2"/>
+          <p:cNvPr id="52" name="PlaceHolder 2"/>
           <p:cNvSpPr>
             <a:spLocks noGrp="1"/>
           </p:cNvSpPr>
@@ -7923,7 +4891,7 @@
         <p:spPr>
           <a:xfrm>
             <a:off x="457200" y="1600200"/>
-            <a:ext cx="8228880" cy="4525200"/>
+            <a:ext cx="8228160" cy="4524480"/>
           </a:xfrm>
           <a:prstGeom prst="rect">
             <a:avLst/>
@@ -8156,7 +5124,7 @@
       </p:grpSpPr>
       <p:sp>
         <p:nvSpPr>
-          <p:cNvPr id="94" name="PlaceHolder 1"/>
+          <p:cNvPr id="53" name="PlaceHolder 1"/>
           <p:cNvSpPr>
             <a:spLocks noGrp="1"/>
           </p:cNvSpPr>
@@ -8167,7 +5135,7 @@
         <p:spPr>
           <a:xfrm>
             <a:off x="457200" y="274680"/>
-            <a:ext cx="8228520" cy="1141920"/>
+            <a:ext cx="8227800" cy="1141200"/>
           </a:xfrm>
           <a:prstGeom prst="rect">
             <a:avLst/>
@@ -8211,7 +5179,7 @@
       </p:sp>
       <p:sp>
         <p:nvSpPr>
-          <p:cNvPr id="95" name="PlaceHolder 2"/>
+          <p:cNvPr id="54" name="PlaceHolder 2"/>
           <p:cNvSpPr>
             <a:spLocks noGrp="1"/>
           </p:cNvSpPr>
@@ -8222,7 +5190,7 @@
         <p:spPr>
           <a:xfrm>
             <a:off x="228960" y="1600200"/>
-            <a:ext cx="8228520" cy="4524840"/>
+            <a:ext cx="8227800" cy="4524120"/>
           </a:xfrm>
           <a:prstGeom prst="rect">
             <a:avLst/>
@@ -8282,59 +5250,6 @@
               </a:rPr>
               <a:t>Terraform – declarative IaC, HCL syntax, wide provider support</a:t>
             </a:r>
-            <a:endParaRPr b="0" lang="en-US" sz="1800" spc="-1" strike="noStrike">
-              <a:solidFill>
-                <a:srgbClr val="000000"/>
-              </a:solidFill>
-              <a:latin typeface="Arial"/>
-            </a:endParaRPr>
-          </a:p>
-          <a:p>
-            <a:pPr marL="343080" indent="-343080" defTabSz="457200">
-              <a:lnSpc>
-                <a:spcPct val="100000"/>
-              </a:lnSpc>
-              <a:spcBef>
-                <a:spcPts val="360"/>
-              </a:spcBef>
-              <a:buClr>
-                <a:srgbClr val="333333"/>
-              </a:buClr>
-              <a:buFont typeface="Arial"/>
-              <a:buChar char="•"/>
-              <a:tabLst>
-                <a:tab algn="l" pos="0"/>
-              </a:tabLst>
-            </a:pPr>
-            <a:r>
-              <a:rPr b="0" lang="en-US" sz="1800" spc="-1" strike="noStrike">
-                <a:solidFill>
-                  <a:srgbClr val="333333"/>
-                </a:solidFill>
-                <a:latin typeface="Calibri"/>
-              </a:rPr>
-              <a:t>Terragrunt – DRY wrapper for Terraform, remote state, env orchestration</a:t>
-            </a:r>
-            <a:endParaRPr b="0" lang="en-US" sz="1800" spc="-1" strike="noStrike">
-              <a:solidFill>
-                <a:srgbClr val="000000"/>
-              </a:solidFill>
-              <a:latin typeface="Arial"/>
-            </a:endParaRPr>
-          </a:p>
-          <a:p>
-            <a:pPr marL="343080" indent="0" defTabSz="457200">
-              <a:lnSpc>
-                <a:spcPct val="100000"/>
-              </a:lnSpc>
-              <a:spcBef>
-                <a:spcPts val="360"/>
-              </a:spcBef>
-              <a:buNone/>
-              <a:tabLst>
-                <a:tab algn="l" pos="0"/>
-              </a:tabLst>
-            </a:pPr>
             <a:endParaRPr b="0" lang="en-US" sz="1800" spc="-1" strike="noStrike">
               <a:solidFill>
                 <a:srgbClr val="000000"/>
@@ -8409,7 +5324,7 @@
       </p:grpSpPr>
       <p:sp>
         <p:nvSpPr>
-          <p:cNvPr id="96" name="PlaceHolder 1"/>
+          <p:cNvPr id="55" name="PlaceHolder 1"/>
           <p:cNvSpPr>
             <a:spLocks noGrp="1"/>
           </p:cNvSpPr>
@@ -8420,7 +5335,7 @@
         <p:spPr>
           <a:xfrm>
             <a:off x="457200" y="274680"/>
-            <a:ext cx="8228520" cy="1141920"/>
+            <a:ext cx="8227800" cy="1141200"/>
           </a:xfrm>
           <a:prstGeom prst="rect">
             <a:avLst/>
@@ -8464,7 +5379,7 @@
       </p:sp>
       <p:sp>
         <p:nvSpPr>
-          <p:cNvPr id="97" name="PlaceHolder 2"/>
+          <p:cNvPr id="56" name="PlaceHolder 2"/>
           <p:cNvSpPr>
             <a:spLocks noGrp="1"/>
           </p:cNvSpPr>
@@ -8475,7 +5390,7 @@
         <p:spPr>
           <a:xfrm>
             <a:off x="457200" y="1600200"/>
-            <a:ext cx="8228520" cy="4524840"/>
+            <a:ext cx="8227800" cy="4524120"/>
           </a:xfrm>
           <a:prstGeom prst="rect">
             <a:avLst/>
@@ -8828,113 +5743,7 @@
 </a:theme>
 </file>
 
-<file path=ppt/theme/theme14.xml><?xml version="1.0" encoding="utf-8"?>
-<a:theme xmlns:a="http://schemas.openxmlformats.org/drawingml/2006/main" xmlns:r="http://schemas.openxmlformats.org/officeDocument/2006/relationships" name="Office Theme">
-  <a:themeElements>
-    <a:clrScheme name="LibreOffice">
-      <a:dk1>
-        <a:srgbClr val="000000"/>
-      </a:dk1>
-      <a:lt1>
-        <a:srgbClr val="ffffff"/>
-      </a:lt1>
-      <a:dk2>
-        <a:srgbClr val="000000"/>
-      </a:dk2>
-      <a:lt2>
-        <a:srgbClr val="ffffff"/>
-      </a:lt2>
-      <a:accent1>
-        <a:srgbClr val="18a303"/>
-      </a:accent1>
-      <a:accent2>
-        <a:srgbClr val="0369a3"/>
-      </a:accent2>
-      <a:accent3>
-        <a:srgbClr val="a33e03"/>
-      </a:accent3>
-      <a:accent4>
-        <a:srgbClr val="8e03a3"/>
-      </a:accent4>
-      <a:accent5>
-        <a:srgbClr val="c99c00"/>
-      </a:accent5>
-      <a:accent6>
-        <a:srgbClr val="c9211e"/>
-      </a:accent6>
-      <a:hlink>
-        <a:srgbClr val="0000ee"/>
-      </a:hlink>
-      <a:folHlink>
-        <a:srgbClr val="551a8b"/>
-      </a:folHlink>
-    </a:clrScheme>
-    <a:fontScheme name="Office">
-      <a:majorFont>
-        <a:latin typeface="Arial" pitchFamily="0" charset="1"/>
-        <a:ea typeface="DejaVu Sans" pitchFamily="0" charset="1"/>
-        <a:cs typeface="DejaVu Sans" pitchFamily="0" charset="1"/>
-      </a:majorFont>
-      <a:minorFont>
-        <a:latin typeface="Arial" pitchFamily="0" charset="1"/>
-        <a:ea typeface="DejaVu Sans" pitchFamily="0" charset="1"/>
-        <a:cs typeface="DejaVu Sans" pitchFamily="0" charset="1"/>
-      </a:minorFont>
-    </a:fontScheme>
-    <a:fmtScheme>
-      <a:fillStyleLst>
-        <a:solidFill>
-          <a:schemeClr val="phClr"/>
-        </a:solidFill>
-        <a:solidFill>
-          <a:schemeClr val="phClr"/>
-        </a:solidFill>
-        <a:solidFill>
-          <a:schemeClr val="phClr"/>
-        </a:solidFill>
-      </a:fillStyleLst>
-      <a:lnStyleLst>
-        <a:ln w="6350" cap="flat" cmpd="sng" algn="ctr">
-          <a:prstDash val="solid"/>
-          <a:miter/>
-        </a:ln>
-        <a:ln w="6350" cap="flat" cmpd="sng" algn="ctr">
-          <a:prstDash val="solid"/>
-          <a:miter/>
-        </a:ln>
-        <a:ln w="6350" cap="flat" cmpd="sng" algn="ctr">
-          <a:prstDash val="solid"/>
-          <a:miter/>
-        </a:ln>
-      </a:lnStyleLst>
-      <a:effectStyleLst>
-        <a:effectStyle>
-          <a:effectLst/>
-        </a:effectStyle>
-        <a:effectStyle>
-          <a:effectLst/>
-        </a:effectStyle>
-        <a:effectStyle>
-          <a:effectLst/>
-        </a:effectStyle>
-      </a:effectStyleLst>
-      <a:bgFillStyleLst>
-        <a:solidFill>
-          <a:schemeClr val="phClr"/>
-        </a:solidFill>
-        <a:solidFill>
-          <a:schemeClr val="phClr"/>
-        </a:solidFill>
-        <a:solidFill>
-          <a:schemeClr val="phClr"/>
-        </a:solidFill>
-      </a:bgFillStyleLst>
-    </a:fmtScheme>
-  </a:themeElements>
-</a:theme>
-</file>
-
-<file path=ppt/theme/theme2.xml><?xml version="1.0" encoding="utf-8"?>
+<file path=ppt/theme/theme13.xml><?xml version="1.0" encoding="utf-8"?>
 <a:theme xmlns:a="http://schemas.openxmlformats.org/drawingml/2006/main" xmlns:r="http://schemas.openxmlformats.org/officeDocument/2006/relationships" name="Office Theme">
   <a:themeElements>
     <a:clrScheme name="LibreOffice">

</xml_diff>